<commit_message>
added record return  for pptx
</commit_message>
<xml_diff>
--- a/filesets/success_plan/success_plan.pptx
+++ b/filesets/success_plan/success_plan.pptx
@@ -5,14 +5,13 @@
     <p:sldMasterId id="2147483765" r:id="rId4"/>
   </p:sldMasterIdLst>
   <p:notesMasterIdLst>
-    <p:notesMasterId r:id="rId7"/>
+    <p:notesMasterId r:id="rId6"/>
   </p:notesMasterIdLst>
   <p:handoutMasterIdLst>
-    <p:handoutMasterId r:id="rId8"/>
+    <p:handoutMasterId r:id="rId7"/>
   </p:handoutMasterIdLst>
   <p:sldIdLst>
     <p:sldId id="288" r:id="rId5"/>
-    <p:sldId id="289" r:id="rId6"/>
   </p:sldIdLst>
   <p:sldSz cx="12192000" cy="6858000"/>
   <p:notesSz cx="6858000" cy="9144000"/>
@@ -4643,7 +4642,9 @@
             <a:r>
               <a:rPr lang="en-US" sz="2000" b="1" dirty="0">
                 <a:solidFill>
-                  <a:srgbClr val="6B767D"/>
+                  <a:schemeClr val="tx1">
+                    <a:lumMod val="75000"/>
+                  </a:schemeClr>
                 </a:solidFill>
                 <a:latin typeface="Arial" panose="020B0604020202020204"/>
               </a:rPr>
@@ -4652,7 +4653,9 @@
             <a:r>
               <a:rPr lang="en-US" sz="2000" b="1" dirty="0" err="1">
                 <a:solidFill>
-                  <a:srgbClr val="6B767D"/>
+                  <a:schemeClr val="tx1">
+                    <a:lumMod val="75000"/>
+                  </a:schemeClr>
                 </a:solidFill>
                 <a:latin typeface="Arial" panose="020B0604020202020204"/>
               </a:rPr>
@@ -4661,7 +4664,9 @@
             <a:r>
               <a:rPr lang="en-US" sz="2000" b="1" dirty="0" err="1">
                 <a:solidFill>
-                  <a:srgbClr val="6B767D"/>
+                  <a:schemeClr val="tx1">
+                    <a:lumMod val="75000"/>
+                  </a:schemeClr>
                 </a:solidFill>
               </a:rPr>
               <a:t>:user_counts.csv</a:t>
@@ -4669,7 +4674,9 @@
             <a:r>
               <a:rPr lang="en-US" sz="2000" b="1" dirty="0">
                 <a:solidFill>
-                  <a:srgbClr val="6B767D"/>
+                  <a:schemeClr val="tx1">
+                    <a:lumMod val="75000"/>
+                  </a:schemeClr>
                 </a:solidFill>
               </a:rPr>
               <a:t>[</a:t>
@@ -4677,11 +4684,13 @@
             <a:r>
               <a:rPr lang="en-US" sz="2000" b="1" dirty="0">
                 <a:solidFill>
-                  <a:srgbClr val="6B767D"/>
+                  <a:schemeClr val="tx1">
+                    <a:lumMod val="75000"/>
+                  </a:schemeClr>
                 </a:solidFill>
                 <a:latin typeface="Arial" panose="020B0604020202020204"/>
               </a:rPr>
-              <a:t>2:2]}} </a:t>
+              <a:t>2:3]}} </a:t>
             </a:r>
             <a:r>
               <a:rPr kumimoji="0" lang="en-US" sz="1800" b="0" i="0" u="none" strike="noStrike" kern="1200" cap="none" spc="0" normalizeH="0" baseline="0" noProof="0" dirty="0">
@@ -4689,7 +4698,9 @@
                   <a:noFill/>
                 </a:ln>
                 <a:solidFill>
-                  <a:srgbClr val="6B767D"/>
+                  <a:schemeClr val="tx1">
+                    <a:lumMod val="75000"/>
+                  </a:schemeClr>
                 </a:solidFill>
                 <a:effectLst/>
                 <a:uLnTx/>
@@ -4706,7 +4717,9 @@
                   <a:noFill/>
                 </a:ln>
                 <a:solidFill>
-                  <a:srgbClr val="6B767D"/>
+                  <a:schemeClr val="tx1">
+                    <a:lumMod val="75000"/>
+                  </a:schemeClr>
                 </a:solidFill>
                 <a:effectLst/>
                 <a:uLnTx/>
@@ -4719,7 +4732,9 @@
             <a:r>
               <a:rPr lang="en-US" sz="2000" b="1" dirty="0">
                 <a:solidFill>
-                  <a:srgbClr val="6B767D"/>
+                  <a:schemeClr val="tx1">
+                    <a:lumMod val="75000"/>
+                  </a:schemeClr>
                 </a:solidFill>
               </a:rPr>
               <a:t>{{</a:t>
@@ -4727,7 +4742,9 @@
             <a:r>
               <a:rPr lang="en-US" sz="2000" b="1" dirty="0" err="1">
                 <a:solidFill>
-                  <a:srgbClr val="6B767D"/>
+                  <a:schemeClr val="tx1">
+                    <a:lumMod val="75000"/>
+                  </a:schemeClr>
                 </a:solidFill>
               </a:rPr>
               <a:t>val:user_counts.csv</a:t>
@@ -4735,10 +4752,12 @@
             <a:r>
               <a:rPr lang="en-US" sz="2000" b="1" dirty="0">
                 <a:solidFill>
-                  <a:srgbClr val="6B767D"/>
+                  <a:schemeClr val="tx1">
+                    <a:lumMod val="75000"/>
+                  </a:schemeClr>
                 </a:solidFill>
               </a:rPr>
-              <a:t>[2:1]}}</a:t>
+              <a:t>[2:2]}}</a:t>
             </a:r>
             <a:r>
               <a:rPr kumimoji="0" lang="en-US" sz="1800" b="0" i="0" u="none" strike="noStrike" kern="1200" cap="none" spc="0" normalizeH="0" baseline="0" noProof="0" dirty="0">
@@ -4746,7 +4765,9 @@
                   <a:noFill/>
                 </a:ln>
                 <a:solidFill>
-                  <a:srgbClr val="6B767D"/>
+                  <a:schemeClr val="tx1">
+                    <a:lumMod val="75000"/>
+                  </a:schemeClr>
                 </a:solidFill>
                 <a:effectLst/>
                 <a:uLnTx/>
@@ -4765,7 +4786,9 @@
             <a:r>
               <a:rPr lang="en-US" sz="2000" b="1" dirty="0">
                 <a:solidFill>
-                  <a:srgbClr val="6B767D"/>
+                  <a:schemeClr val="tx1">
+                    <a:lumMod val="75000"/>
+                  </a:schemeClr>
                 </a:solidFill>
               </a:rPr>
               <a:t>{{</a:t>
@@ -4773,7 +4796,9 @@
             <a:r>
               <a:rPr lang="en-US" sz="2000" b="1" dirty="0" err="1">
                 <a:solidFill>
-                  <a:srgbClr val="6B767D"/>
+                  <a:schemeClr val="tx1">
+                    <a:lumMod val="75000"/>
+                  </a:schemeClr>
                 </a:solidFill>
               </a:rPr>
               <a:t>val:concurrency_maxpeak.csv</a:t>
@@ -4781,7 +4806,9 @@
             <a:r>
               <a:rPr lang="en-US" sz="2000" b="1" dirty="0">
                 <a:solidFill>
-                  <a:srgbClr val="6B767D"/>
+                  <a:schemeClr val="tx1">
+                    <a:lumMod val="75000"/>
+                  </a:schemeClr>
                 </a:solidFill>
               </a:rPr>
               <a:t>[1:1]}}</a:t>
@@ -4792,7 +4819,9 @@
                   <a:noFill/>
                 </a:ln>
                 <a:solidFill>
-                  <a:srgbClr val="6B767D"/>
+                  <a:schemeClr val="tx1">
+                    <a:lumMod val="75000"/>
+                  </a:schemeClr>
                 </a:solidFill>
                 <a:effectLst/>
                 <a:uLnTx/>
@@ -4801,7 +4830,7 @@
                 <a:ea typeface="+mn-ea"/>
                 <a:cs typeface="+mn-cs"/>
               </a:rPr>
-              <a:t> Peak concurrent users	</a:t>
+              <a:t> Peak concurrent users</a:t>
             </a:r>
           </a:p>
         </p:txBody>
@@ -4859,235 +4888,6 @@
     <p:extLst>
       <p:ext uri="{BB962C8B-B14F-4D97-AF65-F5344CB8AC3E}">
         <p14:creationId xmlns:p14="http://schemas.microsoft.com/office/powerpoint/2010/main" val="3249423717"/>
-      </p:ext>
-    </p:extLst>
-  </p:cSld>
-  <p:clrMapOvr>
-    <a:masterClrMapping/>
-  </p:clrMapOvr>
-</p:sld>
-</file>
-
-<file path=ppt/slides/slide2.xml><?xml version="1.0" encoding="utf-8"?>
-<p:sld xmlns:a="http://schemas.openxmlformats.org/drawingml/2006/main" xmlns:r="http://schemas.openxmlformats.org/officeDocument/2006/relationships" xmlns:p="http://schemas.openxmlformats.org/presentationml/2006/main">
-  <p:cSld>
-    <p:spTree>
-      <p:nvGrpSpPr>
-        <p:cNvPr id="1" name=""/>
-        <p:cNvGrpSpPr/>
-        <p:nvPr/>
-      </p:nvGrpSpPr>
-      <p:grpSpPr>
-        <a:xfrm>
-          <a:off x="0" y="0"/>
-          <a:ext cx="0" cy="0"/>
-          <a:chOff x="0" y="0"/>
-          <a:chExt cx="0" cy="0"/>
-        </a:xfrm>
-      </p:grpSpPr>
-      <p:sp>
-        <p:nvSpPr>
-          <p:cNvPr id="2" name="Title 1">
-            <a:extLst>
-              <a:ext uri="{FF2B5EF4-FFF2-40B4-BE49-F238E27FC236}">
-                <a16:creationId xmlns:a16="http://schemas.microsoft.com/office/drawing/2014/main" id="{80BECF2A-8482-C14B-A6EC-5A839B05889D}"/>
-              </a:ext>
-            </a:extLst>
-          </p:cNvPr>
-          <p:cNvSpPr>
-            <a:spLocks noGrp="1"/>
-          </p:cNvSpPr>
-          <p:nvPr>
-            <p:ph type="title"/>
-          </p:nvPr>
-        </p:nvSpPr>
-        <p:spPr/>
-        <p:txBody>
-          <a:bodyPr/>
-          <a:lstStyle/>
-          <a:p>
-            <a:r>
-              <a:rPr lang="en-US" dirty="0"/>
-              <a:t>CPU Consumption</a:t>
-            </a:r>
-          </a:p>
-        </p:txBody>
-      </p:sp>
-      <p:sp>
-        <p:nvSpPr>
-          <p:cNvPr id="4" name="Rectangle 3">
-            <a:extLst>
-              <a:ext uri="{FF2B5EF4-FFF2-40B4-BE49-F238E27FC236}">
-                <a16:creationId xmlns:a16="http://schemas.microsoft.com/office/drawing/2014/main" id="{85493525-1AE6-7549-BBEF-B3AB448CCFB4}"/>
-              </a:ext>
-            </a:extLst>
-          </p:cNvPr>
-          <p:cNvSpPr/>
-          <p:nvPr/>
-        </p:nvSpPr>
-        <p:spPr>
-          <a:xfrm>
-            <a:off x="6437246" y="1331842"/>
-            <a:ext cx="5400259" cy="4733421"/>
-          </a:xfrm>
-          <a:prstGeom prst="rect">
-            <a:avLst/>
-          </a:prstGeom>
-        </p:spPr>
-        <p:style>
-          <a:lnRef idx="2">
-            <a:schemeClr val="accent1">
-              <a:shade val="50000"/>
-            </a:schemeClr>
-          </a:lnRef>
-          <a:fillRef idx="1">
-            <a:schemeClr val="accent1"/>
-          </a:fillRef>
-          <a:effectRef idx="0">
-            <a:schemeClr val="accent1"/>
-          </a:effectRef>
-          <a:fontRef idx="minor">
-            <a:schemeClr val="lt1"/>
-          </a:fontRef>
-        </p:style>
-        <p:txBody>
-          <a:bodyPr rtlCol="0" anchor="ctr"/>
-          <a:lstStyle/>
-          <a:p>
-            <a:pPr algn="ctr"/>
-            <a:r>
-              <a:rPr lang="en-US" dirty="0"/>
-              <a:t>{{</a:t>
-            </a:r>
-            <a:r>
-              <a:rPr lang="en-US" dirty="0" err="1"/>
-              <a:t>pic:cpu_summary.CPU_time_BoxPlot.png</a:t>
-            </a:r>
-            <a:r>
-              <a:rPr lang="en-US" dirty="0"/>
-              <a:t>}}</a:t>
-            </a:r>
-          </a:p>
-        </p:txBody>
-      </p:sp>
-      <p:sp>
-        <p:nvSpPr>
-          <p:cNvPr id="3" name="Rectangle 2">
-            <a:extLst>
-              <a:ext uri="{FF2B5EF4-FFF2-40B4-BE49-F238E27FC236}">
-                <a16:creationId xmlns:a16="http://schemas.microsoft.com/office/drawing/2014/main" id="{48419C8F-FE2C-A147-ACE3-E0D1A6314BF8}"/>
-              </a:ext>
-            </a:extLst>
-          </p:cNvPr>
-          <p:cNvSpPr/>
-          <p:nvPr/>
-        </p:nvSpPr>
-        <p:spPr>
-          <a:xfrm>
-            <a:off x="532233" y="1331843"/>
-            <a:ext cx="5563767" cy="2256182"/>
-          </a:xfrm>
-          <a:prstGeom prst="rect">
-            <a:avLst/>
-          </a:prstGeom>
-        </p:spPr>
-        <p:style>
-          <a:lnRef idx="2">
-            <a:schemeClr val="accent1">
-              <a:shade val="50000"/>
-            </a:schemeClr>
-          </a:lnRef>
-          <a:fillRef idx="1">
-            <a:schemeClr val="accent1"/>
-          </a:fillRef>
-          <a:effectRef idx="0">
-            <a:schemeClr val="accent1"/>
-          </a:effectRef>
-          <a:fontRef idx="minor">
-            <a:schemeClr val="lt1"/>
-          </a:fontRef>
-        </p:style>
-        <p:txBody>
-          <a:bodyPr rtlCol="0" anchor="ctr"/>
-          <a:lstStyle/>
-          <a:p>
-            <a:pPr algn="ctr"/>
-            <a:r>
-              <a:rPr lang="en-US" dirty="0"/>
-              <a:t>{{</a:t>
-            </a:r>
-            <a:r>
-              <a:rPr lang="en-US" dirty="0" err="1"/>
-              <a:t>pic:cpu_summary.Daily_Mean_Usage.png</a:t>
-            </a:r>
-            <a:r>
-              <a:rPr lang="en-US" dirty="0"/>
-              <a:t>}}</a:t>
-            </a:r>
-          </a:p>
-        </p:txBody>
-      </p:sp>
-      <p:sp>
-        <p:nvSpPr>
-          <p:cNvPr id="5" name="Rectangle 4">
-            <a:extLst>
-              <a:ext uri="{FF2B5EF4-FFF2-40B4-BE49-F238E27FC236}">
-                <a16:creationId xmlns:a16="http://schemas.microsoft.com/office/drawing/2014/main" id="{677D2EBF-583D-C84D-91BC-19DCDD8E9450}"/>
-              </a:ext>
-            </a:extLst>
-          </p:cNvPr>
-          <p:cNvSpPr/>
-          <p:nvPr/>
-        </p:nvSpPr>
-        <p:spPr>
-          <a:xfrm>
-            <a:off x="532233" y="3809082"/>
-            <a:ext cx="5563767" cy="2256182"/>
-          </a:xfrm>
-          <a:prstGeom prst="rect">
-            <a:avLst/>
-          </a:prstGeom>
-        </p:spPr>
-        <p:style>
-          <a:lnRef idx="2">
-            <a:schemeClr val="accent1">
-              <a:shade val="50000"/>
-            </a:schemeClr>
-          </a:lnRef>
-          <a:fillRef idx="1">
-            <a:schemeClr val="accent1"/>
-          </a:fillRef>
-          <a:effectRef idx="0">
-            <a:schemeClr val="accent1"/>
-          </a:effectRef>
-          <a:fontRef idx="minor">
-            <a:schemeClr val="lt1"/>
-          </a:fontRef>
-        </p:style>
-        <p:txBody>
-          <a:bodyPr rtlCol="0" anchor="ctr"/>
-          <a:lstStyle/>
-          <a:p>
-            <a:pPr algn="ctr"/>
-            <a:r>
-              <a:rPr lang="en-US" dirty="0"/>
-              <a:t>{{</a:t>
-            </a:r>
-            <a:r>
-              <a:rPr lang="en-US" dirty="0" err="1"/>
-              <a:t>pic:cpu_summary.CPU_consumption_fraction.png</a:t>
-            </a:r>
-            <a:r>
-              <a:rPr lang="en-US" dirty="0"/>
-              <a:t>}}</a:t>
-            </a:r>
-          </a:p>
-        </p:txBody>
-      </p:sp>
-    </p:spTree>
-    <p:extLst>
-      <p:ext uri="{BB962C8B-B14F-4D97-AF65-F5344CB8AC3E}">
-        <p14:creationId xmlns:p14="http://schemas.microsoft.com/office/powerpoint/2010/main" val="1451785"/>
       </p:ext>
     </p:extLst>
   </p:cSld>
@@ -5949,18 +5749,18 @@
 </file>
 
 <file path=customXml/item1.xml><?xml version="1.0" encoding="utf-8"?>
-<p:properties xmlns:p="http://schemas.microsoft.com/office/2006/metadata/properties" xmlns:xsi="http://www.w3.org/2001/XMLSchema-instance" xmlns:pc="http://schemas.microsoft.com/office/infopath/2007/PartnerControls">
-  <documentManagement/>
-</p:properties>
-</file>
-
-<file path=customXml/item2.xml><?xml version="1.0" encoding="utf-8"?>
 <?mso-contentType ?>
 <FormTemplates xmlns="http://schemas.microsoft.com/sharepoint/v3/contenttype/forms">
   <Display>DocumentLibraryForm</Display>
   <Edit>DocumentLibraryForm</Edit>
   <New>DocumentLibraryForm</New>
 </FormTemplates>
+</file>
+
+<file path=customXml/item2.xml><?xml version="1.0" encoding="utf-8"?>
+<p:properties xmlns:p="http://schemas.microsoft.com/office/2006/metadata/properties" xmlns:xsi="http://www.w3.org/2001/XMLSchema-instance" xmlns:pc="http://schemas.microsoft.com/office/infopath/2007/PartnerControls">
+  <documentManagement/>
+</p:properties>
 </file>
 
 <file path=customXml/item3.xml><?xml version="1.0" encoding="utf-8"?>
@@ -6078,6 +5878,14 @@
 </file>
 
 <file path=customXml/itemProps1.xml><?xml version="1.0" encoding="utf-8"?>
+<ds:datastoreItem xmlns:ds="http://schemas.openxmlformats.org/officeDocument/2006/customXml" ds:itemID="{D03F60F6-267C-4F0B-90AC-53495EF22DB8}">
+  <ds:schemaRefs>
+    <ds:schemaRef ds:uri="http://schemas.microsoft.com/sharepoint/v3/contenttype/forms"/>
+  </ds:schemaRefs>
+</ds:datastoreItem>
+</file>
+
+<file path=customXml/itemProps2.xml><?xml version="1.0" encoding="utf-8"?>
 <ds:datastoreItem xmlns:ds="http://schemas.openxmlformats.org/officeDocument/2006/customXml" ds:itemID="{19C64E80-8200-4669-BC3C-EA57A9064010}">
   <ds:schemaRefs>
     <ds:schemaRef ds:uri="http://schemas.microsoft.com/office/infopath/2007/PartnerControls"/>
@@ -6090,14 +5898,6 @@
     <ds:schemaRef ds:uri="http://schemas.microsoft.com/office/2006/metadata/properties"/>
     <ds:schemaRef ds:uri="http://www.w3.org/XML/1998/namespace"/>
     <ds:schemaRef ds:uri="http://purl.org/dc/terms/"/>
-  </ds:schemaRefs>
-</ds:datastoreItem>
-</file>
-
-<file path=customXml/itemProps2.xml><?xml version="1.0" encoding="utf-8"?>
-<ds:datastoreItem xmlns:ds="http://schemas.openxmlformats.org/officeDocument/2006/customXml" ds:itemID="{D03F60F6-267C-4F0B-90AC-53495EF22DB8}">
-  <ds:schemaRefs>
-    <ds:schemaRef ds:uri="http://schemas.microsoft.com/sharepoint/v3/contenttype/forms"/>
   </ds:schemaRefs>
 </ds:datastoreItem>
 </file>

</xml_diff>

<commit_message>
updated for success plan
</commit_message>
<xml_diff>
--- a/filesets/success_plan/success_plan.pptx
+++ b/filesets/success_plan/success_plan.pptx
@@ -7265,7 +7265,12 @@
             <p:ph type="title"/>
           </p:nvPr>
         </p:nvSpPr>
-        <p:spPr/>
+        <p:spPr>
+          <a:xfrm>
+            <a:off x="4583016" y="395492"/>
+            <a:ext cx="6520065" cy="715294"/>
+          </a:xfrm>
+        </p:spPr>
         <p:txBody>
           <a:bodyPr/>
           <a:lstStyle/>
@@ -7291,8 +7296,8 @@
         </p:nvSpPr>
         <p:spPr>
           <a:xfrm>
-            <a:off x="431320" y="1407863"/>
-            <a:ext cx="2741538" cy="4864342"/>
+            <a:off x="0" y="0"/>
+            <a:ext cx="3966072" cy="6858000"/>
           </a:xfrm>
           <a:prstGeom prst="rect">
             <a:avLst/>
@@ -7397,8 +7402,8 @@
         </p:nvSpPr>
         <p:spPr>
           <a:xfrm>
-            <a:off x="3602516" y="1407864"/>
-            <a:ext cx="8339766" cy="4864342"/>
+            <a:off x="4263528" y="1696598"/>
+            <a:ext cx="7928472" cy="5161402"/>
           </a:xfrm>
           <a:prstGeom prst="rect">
             <a:avLst/>
@@ -7626,7 +7631,7 @@
         </p:nvSpPr>
         <p:spPr>
           <a:xfrm>
-            <a:off x="7293166" y="1410617"/>
+            <a:off x="7304183" y="1994511"/>
             <a:ext cx="4638099" cy="2031325"/>
           </a:xfrm>
           <a:prstGeom prst="rect">
@@ -7845,7 +7850,7 @@
         </p:nvSpPr>
         <p:spPr>
           <a:xfrm>
-            <a:off x="587480" y="4917207"/>
+            <a:off x="587481" y="5131142"/>
             <a:ext cx="5508519" cy="1200329"/>
           </a:xfrm>
           <a:prstGeom prst="rect">
@@ -7920,14 +7925,14 @@
           <p:nvPr>
             <p:extLst>
               <p:ext uri="{D42A27DB-BD31-4B8C-83A1-F6EECF244321}">
-                <p14:modId xmlns:p14="http://schemas.microsoft.com/office/powerpoint/2010/main" val="2427926531"/>
+                <p14:modId xmlns:p14="http://schemas.microsoft.com/office/powerpoint/2010/main" val="2705572930"/>
               </p:ext>
             </p:extLst>
           </p:nvPr>
         </p:nvGraphicFramePr>
         <p:xfrm>
           <a:off x="587481" y="1287624"/>
-          <a:ext cx="10925150" cy="3629584"/>
+          <a:ext cx="10925150" cy="3601760"/>
         </p:xfrm>
         <a:graphic>
           <a:graphicData uri="http://schemas.openxmlformats.org/drawingml/2006/table">
@@ -8007,7 +8012,7 @@
                   </a:extLst>
                 </a:gridCol>
               </a:tblGrid>
-              <a:tr h="427072">
+              <a:tr h="443885">
                 <a:tc>
                   <a:txBody>
                     <a:bodyPr/>
@@ -8144,13 +8149,13 @@
                   </a:ext>
                 </a:extLst>
               </a:tr>
-              <a:tr h="427072">
-                <a:tc>
-                  <a:txBody>
-                    <a:bodyPr/>
-                    <a:lstStyle/>
-                    <a:p>
-                      <a:endParaRPr lang="en-US" sz="1200"/>
+              <a:tr h="296168">
+                <a:tc>
+                  <a:txBody>
+                    <a:bodyPr/>
+                    <a:lstStyle/>
+                    <a:p>
+                      <a:endParaRPr lang="en-US" sz="1200" dirty="0"/>
                     </a:p>
                   </a:txBody>
                   <a:tcPr/>
@@ -8251,13 +8256,13 @@
                   </a:ext>
                 </a:extLst>
               </a:tr>
-              <a:tr h="427072">
-                <a:tc>
-                  <a:txBody>
-                    <a:bodyPr/>
-                    <a:lstStyle/>
-                    <a:p>
-                      <a:endParaRPr lang="en-US" sz="1200"/>
+              <a:tr h="296168">
+                <a:tc>
+                  <a:txBody>
+                    <a:bodyPr/>
+                    <a:lstStyle/>
+                    <a:p>
+                      <a:endParaRPr lang="en-US" sz="1200" dirty="0"/>
                     </a:p>
                   </a:txBody>
                   <a:tcPr/>
@@ -8358,13 +8363,13 @@
                   </a:ext>
                 </a:extLst>
               </a:tr>
-              <a:tr h="427072">
-                <a:tc>
-                  <a:txBody>
-                    <a:bodyPr/>
-                    <a:lstStyle/>
-                    <a:p>
-                      <a:endParaRPr lang="en-US" sz="1200"/>
+              <a:tr h="296168">
+                <a:tc>
+                  <a:txBody>
+                    <a:bodyPr/>
+                    <a:lstStyle/>
+                    <a:p>
+                      <a:endParaRPr lang="en-US" sz="1200" dirty="0"/>
                     </a:p>
                   </a:txBody>
                   <a:tcPr/>
@@ -8465,13 +8470,13 @@
                   </a:ext>
                 </a:extLst>
               </a:tr>
-              <a:tr h="427072">
-                <a:tc>
-                  <a:txBody>
-                    <a:bodyPr/>
-                    <a:lstStyle/>
-                    <a:p>
-                      <a:endParaRPr lang="en-US" sz="1200"/>
+              <a:tr h="296168">
+                <a:tc>
+                  <a:txBody>
+                    <a:bodyPr/>
+                    <a:lstStyle/>
+                    <a:p>
+                      <a:endParaRPr lang="en-US" sz="1200" dirty="0"/>
                     </a:p>
                   </a:txBody>
                   <a:tcPr/>
@@ -8572,13 +8577,13 @@
                   </a:ext>
                 </a:extLst>
               </a:tr>
-              <a:tr h="427072">
-                <a:tc>
-                  <a:txBody>
-                    <a:bodyPr/>
-                    <a:lstStyle/>
-                    <a:p>
-                      <a:endParaRPr lang="en-US" sz="1200"/>
+              <a:tr h="296168">
+                <a:tc>
+                  <a:txBody>
+                    <a:bodyPr/>
+                    <a:lstStyle/>
+                    <a:p>
+                      <a:endParaRPr lang="en-US" sz="1200" dirty="0"/>
                     </a:p>
                   </a:txBody>
                   <a:tcPr/>
@@ -8679,13 +8684,13 @@
                   </a:ext>
                 </a:extLst>
               </a:tr>
-              <a:tr h="427072">
-                <a:tc>
-                  <a:txBody>
-                    <a:bodyPr/>
-                    <a:lstStyle/>
-                    <a:p>
-                      <a:endParaRPr lang="en-US" sz="1200"/>
+              <a:tr h="296168">
+                <a:tc>
+                  <a:txBody>
+                    <a:bodyPr/>
+                    <a:lstStyle/>
+                    <a:p>
+                      <a:endParaRPr lang="en-US" sz="1200" dirty="0"/>
                     </a:p>
                   </a:txBody>
                   <a:tcPr/>
@@ -8786,83 +8791,83 @@
                   </a:ext>
                 </a:extLst>
               </a:tr>
-              <a:tr h="427072">
-                <a:tc>
-                  <a:txBody>
-                    <a:bodyPr/>
-                    <a:lstStyle/>
-                    <a:p>
-                      <a:endParaRPr lang="en-US" sz="1200"/>
-                    </a:p>
-                  </a:txBody>
-                  <a:tcPr/>
-                </a:tc>
-                <a:tc>
-                  <a:txBody>
-                    <a:bodyPr/>
-                    <a:lstStyle/>
-                    <a:p>
-                      <a:endParaRPr lang="en-US" sz="1200"/>
-                    </a:p>
-                  </a:txBody>
-                  <a:tcPr/>
-                </a:tc>
-                <a:tc>
-                  <a:txBody>
-                    <a:bodyPr/>
-                    <a:lstStyle/>
-                    <a:p>
-                      <a:endParaRPr lang="en-US" sz="1200"/>
-                    </a:p>
-                  </a:txBody>
-                  <a:tcPr/>
-                </a:tc>
-                <a:tc>
-                  <a:txBody>
-                    <a:bodyPr/>
-                    <a:lstStyle/>
-                    <a:p>
-                      <a:endParaRPr lang="en-US" sz="1200"/>
-                    </a:p>
-                  </a:txBody>
-                  <a:tcPr/>
-                </a:tc>
-                <a:tc>
-                  <a:txBody>
-                    <a:bodyPr/>
-                    <a:lstStyle/>
-                    <a:p>
-                      <a:endParaRPr lang="en-US" sz="1200"/>
-                    </a:p>
-                  </a:txBody>
-                  <a:tcPr/>
-                </a:tc>
-                <a:tc>
-                  <a:txBody>
-                    <a:bodyPr/>
-                    <a:lstStyle/>
-                    <a:p>
-                      <a:endParaRPr lang="en-US" sz="1200"/>
-                    </a:p>
-                  </a:txBody>
-                  <a:tcPr/>
-                </a:tc>
-                <a:tc>
-                  <a:txBody>
-                    <a:bodyPr/>
-                    <a:lstStyle/>
-                    <a:p>
-                      <a:endParaRPr lang="en-US" sz="1200"/>
-                    </a:p>
-                  </a:txBody>
-                  <a:tcPr/>
-                </a:tc>
-                <a:tc>
-                  <a:txBody>
-                    <a:bodyPr/>
-                    <a:lstStyle/>
-                    <a:p>
-                      <a:endParaRPr lang="en-US" sz="1200"/>
+              <a:tr h="296168">
+                <a:tc>
+                  <a:txBody>
+                    <a:bodyPr/>
+                    <a:lstStyle/>
+                    <a:p>
+                      <a:endParaRPr lang="en-US" sz="1200" dirty="0"/>
+                    </a:p>
+                  </a:txBody>
+                  <a:tcPr/>
+                </a:tc>
+                <a:tc>
+                  <a:txBody>
+                    <a:bodyPr/>
+                    <a:lstStyle/>
+                    <a:p>
+                      <a:endParaRPr lang="en-US" sz="1200" dirty="0"/>
+                    </a:p>
+                  </a:txBody>
+                  <a:tcPr/>
+                </a:tc>
+                <a:tc>
+                  <a:txBody>
+                    <a:bodyPr/>
+                    <a:lstStyle/>
+                    <a:p>
+                      <a:endParaRPr lang="en-US" sz="1200" dirty="0"/>
+                    </a:p>
+                  </a:txBody>
+                  <a:tcPr/>
+                </a:tc>
+                <a:tc>
+                  <a:txBody>
+                    <a:bodyPr/>
+                    <a:lstStyle/>
+                    <a:p>
+                      <a:endParaRPr lang="en-US" sz="1200" dirty="0"/>
+                    </a:p>
+                  </a:txBody>
+                  <a:tcPr/>
+                </a:tc>
+                <a:tc>
+                  <a:txBody>
+                    <a:bodyPr/>
+                    <a:lstStyle/>
+                    <a:p>
+                      <a:endParaRPr lang="en-US" sz="1200" dirty="0"/>
+                    </a:p>
+                  </a:txBody>
+                  <a:tcPr/>
+                </a:tc>
+                <a:tc>
+                  <a:txBody>
+                    <a:bodyPr/>
+                    <a:lstStyle/>
+                    <a:p>
+                      <a:endParaRPr lang="en-US" sz="1200" dirty="0"/>
+                    </a:p>
+                  </a:txBody>
+                  <a:tcPr/>
+                </a:tc>
+                <a:tc>
+                  <a:txBody>
+                    <a:bodyPr/>
+                    <a:lstStyle/>
+                    <a:p>
+                      <a:endParaRPr lang="en-US" sz="1200" dirty="0"/>
+                    </a:p>
+                  </a:txBody>
+                  <a:tcPr/>
+                </a:tc>
+                <a:tc>
+                  <a:txBody>
+                    <a:bodyPr/>
+                    <a:lstStyle/>
+                    <a:p>
+                      <a:endParaRPr lang="en-US" sz="1200" dirty="0"/>
                     </a:p>
                   </a:txBody>
                   <a:tcPr/>
@@ -8890,6 +8895,327 @@
                 <a:extLst>
                   <a:ext uri="{0D108BD9-81ED-4DB2-BD59-A6C34878D82A}">
                     <a16:rowId xmlns:a16="http://schemas.microsoft.com/office/drawing/2014/main" val="1518623288"/>
+                  </a:ext>
+                </a:extLst>
+              </a:tr>
+              <a:tr h="296168">
+                <a:tc>
+                  <a:txBody>
+                    <a:bodyPr/>
+                    <a:lstStyle/>
+                    <a:p>
+                      <a:endParaRPr lang="en-US" sz="1200" dirty="0"/>
+                    </a:p>
+                  </a:txBody>
+                  <a:tcPr/>
+                </a:tc>
+                <a:tc>
+                  <a:txBody>
+                    <a:bodyPr/>
+                    <a:lstStyle/>
+                    <a:p>
+                      <a:endParaRPr lang="en-US" sz="1200" dirty="0"/>
+                    </a:p>
+                  </a:txBody>
+                  <a:tcPr/>
+                </a:tc>
+                <a:tc>
+                  <a:txBody>
+                    <a:bodyPr/>
+                    <a:lstStyle/>
+                    <a:p>
+                      <a:endParaRPr lang="en-US" sz="1200" dirty="0"/>
+                    </a:p>
+                  </a:txBody>
+                  <a:tcPr/>
+                </a:tc>
+                <a:tc>
+                  <a:txBody>
+                    <a:bodyPr/>
+                    <a:lstStyle/>
+                    <a:p>
+                      <a:endParaRPr lang="en-US" sz="1200" dirty="0"/>
+                    </a:p>
+                  </a:txBody>
+                  <a:tcPr/>
+                </a:tc>
+                <a:tc>
+                  <a:txBody>
+                    <a:bodyPr/>
+                    <a:lstStyle/>
+                    <a:p>
+                      <a:endParaRPr lang="en-US" sz="1200" dirty="0"/>
+                    </a:p>
+                  </a:txBody>
+                  <a:tcPr/>
+                </a:tc>
+                <a:tc>
+                  <a:txBody>
+                    <a:bodyPr/>
+                    <a:lstStyle/>
+                    <a:p>
+                      <a:endParaRPr lang="en-US" sz="1200" dirty="0"/>
+                    </a:p>
+                  </a:txBody>
+                  <a:tcPr/>
+                </a:tc>
+                <a:tc>
+                  <a:txBody>
+                    <a:bodyPr/>
+                    <a:lstStyle/>
+                    <a:p>
+                      <a:endParaRPr lang="en-US" sz="1200" dirty="0"/>
+                    </a:p>
+                  </a:txBody>
+                  <a:tcPr/>
+                </a:tc>
+                <a:tc>
+                  <a:txBody>
+                    <a:bodyPr/>
+                    <a:lstStyle/>
+                    <a:p>
+                      <a:endParaRPr lang="en-US" sz="1200" dirty="0"/>
+                    </a:p>
+                  </a:txBody>
+                  <a:tcPr/>
+                </a:tc>
+                <a:tc>
+                  <a:txBody>
+                    <a:bodyPr/>
+                    <a:lstStyle/>
+                    <a:p>
+                      <a:endParaRPr lang="en-US" sz="1200" dirty="0"/>
+                    </a:p>
+                  </a:txBody>
+                  <a:tcPr/>
+                </a:tc>
+                <a:tc>
+                  <a:txBody>
+                    <a:bodyPr/>
+                    <a:lstStyle/>
+                    <a:p>
+                      <a:endParaRPr lang="en-US" sz="1200" dirty="0"/>
+                    </a:p>
+                  </a:txBody>
+                  <a:tcPr/>
+                </a:tc>
+                <a:extLst>
+                  <a:ext uri="{0D108BD9-81ED-4DB2-BD59-A6C34878D82A}">
+                    <a16:rowId xmlns:a16="http://schemas.microsoft.com/office/drawing/2014/main" val="226657274"/>
+                  </a:ext>
+                </a:extLst>
+              </a:tr>
+              <a:tr h="296168">
+                <a:tc>
+                  <a:txBody>
+                    <a:bodyPr/>
+                    <a:lstStyle/>
+                    <a:p>
+                      <a:endParaRPr lang="en-US" sz="1200" dirty="0"/>
+                    </a:p>
+                  </a:txBody>
+                  <a:tcPr/>
+                </a:tc>
+                <a:tc>
+                  <a:txBody>
+                    <a:bodyPr/>
+                    <a:lstStyle/>
+                    <a:p>
+                      <a:endParaRPr lang="en-US" sz="1200" dirty="0"/>
+                    </a:p>
+                  </a:txBody>
+                  <a:tcPr/>
+                </a:tc>
+                <a:tc>
+                  <a:txBody>
+                    <a:bodyPr/>
+                    <a:lstStyle/>
+                    <a:p>
+                      <a:endParaRPr lang="en-US" sz="1200" dirty="0"/>
+                    </a:p>
+                  </a:txBody>
+                  <a:tcPr/>
+                </a:tc>
+                <a:tc>
+                  <a:txBody>
+                    <a:bodyPr/>
+                    <a:lstStyle/>
+                    <a:p>
+                      <a:endParaRPr lang="en-US" sz="1200" dirty="0"/>
+                    </a:p>
+                  </a:txBody>
+                  <a:tcPr/>
+                </a:tc>
+                <a:tc>
+                  <a:txBody>
+                    <a:bodyPr/>
+                    <a:lstStyle/>
+                    <a:p>
+                      <a:endParaRPr lang="en-US" sz="1200" dirty="0"/>
+                    </a:p>
+                  </a:txBody>
+                  <a:tcPr/>
+                </a:tc>
+                <a:tc>
+                  <a:txBody>
+                    <a:bodyPr/>
+                    <a:lstStyle/>
+                    <a:p>
+                      <a:endParaRPr lang="en-US" sz="1200" dirty="0"/>
+                    </a:p>
+                  </a:txBody>
+                  <a:tcPr/>
+                </a:tc>
+                <a:tc>
+                  <a:txBody>
+                    <a:bodyPr/>
+                    <a:lstStyle/>
+                    <a:p>
+                      <a:endParaRPr lang="en-US" sz="1200" dirty="0"/>
+                    </a:p>
+                  </a:txBody>
+                  <a:tcPr/>
+                </a:tc>
+                <a:tc>
+                  <a:txBody>
+                    <a:bodyPr/>
+                    <a:lstStyle/>
+                    <a:p>
+                      <a:endParaRPr lang="en-US" sz="1200" dirty="0"/>
+                    </a:p>
+                  </a:txBody>
+                  <a:tcPr/>
+                </a:tc>
+                <a:tc>
+                  <a:txBody>
+                    <a:bodyPr/>
+                    <a:lstStyle/>
+                    <a:p>
+                      <a:endParaRPr lang="en-US" sz="1200" dirty="0"/>
+                    </a:p>
+                  </a:txBody>
+                  <a:tcPr/>
+                </a:tc>
+                <a:tc>
+                  <a:txBody>
+                    <a:bodyPr/>
+                    <a:lstStyle/>
+                    <a:p>
+                      <a:endParaRPr lang="en-US" sz="1200" dirty="0"/>
+                    </a:p>
+                  </a:txBody>
+                  <a:tcPr/>
+                </a:tc>
+                <a:extLst>
+                  <a:ext uri="{0D108BD9-81ED-4DB2-BD59-A6C34878D82A}">
+                    <a16:rowId xmlns:a16="http://schemas.microsoft.com/office/drawing/2014/main" val="4079905487"/>
+                  </a:ext>
+                </a:extLst>
+              </a:tr>
+              <a:tr h="296168">
+                <a:tc>
+                  <a:txBody>
+                    <a:bodyPr/>
+                    <a:lstStyle/>
+                    <a:p>
+                      <a:endParaRPr lang="en-US" sz="1200" dirty="0"/>
+                    </a:p>
+                  </a:txBody>
+                  <a:tcPr/>
+                </a:tc>
+                <a:tc>
+                  <a:txBody>
+                    <a:bodyPr/>
+                    <a:lstStyle/>
+                    <a:p>
+                      <a:endParaRPr lang="en-US" sz="1200" dirty="0"/>
+                    </a:p>
+                  </a:txBody>
+                  <a:tcPr/>
+                </a:tc>
+                <a:tc>
+                  <a:txBody>
+                    <a:bodyPr/>
+                    <a:lstStyle/>
+                    <a:p>
+                      <a:endParaRPr lang="en-US" sz="1200" dirty="0"/>
+                    </a:p>
+                  </a:txBody>
+                  <a:tcPr/>
+                </a:tc>
+                <a:tc>
+                  <a:txBody>
+                    <a:bodyPr/>
+                    <a:lstStyle/>
+                    <a:p>
+                      <a:endParaRPr lang="en-US" sz="1200" dirty="0"/>
+                    </a:p>
+                  </a:txBody>
+                  <a:tcPr/>
+                </a:tc>
+                <a:tc>
+                  <a:txBody>
+                    <a:bodyPr/>
+                    <a:lstStyle/>
+                    <a:p>
+                      <a:endParaRPr lang="en-US" sz="1200" dirty="0"/>
+                    </a:p>
+                  </a:txBody>
+                  <a:tcPr/>
+                </a:tc>
+                <a:tc>
+                  <a:txBody>
+                    <a:bodyPr/>
+                    <a:lstStyle/>
+                    <a:p>
+                      <a:endParaRPr lang="en-US" sz="1200" dirty="0"/>
+                    </a:p>
+                  </a:txBody>
+                  <a:tcPr/>
+                </a:tc>
+                <a:tc>
+                  <a:txBody>
+                    <a:bodyPr/>
+                    <a:lstStyle/>
+                    <a:p>
+                      <a:endParaRPr lang="en-US" sz="1200" dirty="0"/>
+                    </a:p>
+                  </a:txBody>
+                  <a:tcPr/>
+                </a:tc>
+                <a:tc>
+                  <a:txBody>
+                    <a:bodyPr/>
+                    <a:lstStyle/>
+                    <a:p>
+                      <a:endParaRPr lang="en-US" sz="1200" dirty="0"/>
+                    </a:p>
+                  </a:txBody>
+                  <a:tcPr/>
+                </a:tc>
+                <a:tc>
+                  <a:txBody>
+                    <a:bodyPr/>
+                    <a:lstStyle/>
+                    <a:p>
+                      <a:endParaRPr lang="en-US" sz="1200" dirty="0"/>
+                    </a:p>
+                  </a:txBody>
+                  <a:tcPr/>
+                </a:tc>
+                <a:tc>
+                  <a:txBody>
+                    <a:bodyPr/>
+                    <a:lstStyle/>
+                    <a:p>
+                      <a:endParaRPr lang="en-US" sz="1200" dirty="0"/>
+                    </a:p>
+                  </a:txBody>
+                  <a:tcPr/>
+                </a:tc>
+                <a:extLst>
+                  <a:ext uri="{0D108BD9-81ED-4DB2-BD59-A6C34878D82A}">
+                    <a16:rowId xmlns:a16="http://schemas.microsoft.com/office/drawing/2014/main" val="2965393862"/>
                   </a:ext>
                 </a:extLst>
               </a:tr>
@@ -8911,7 +9237,7 @@
         </p:nvSpPr>
         <p:spPr>
           <a:xfrm>
-            <a:off x="6095999" y="4917207"/>
+            <a:off x="6096000" y="5131142"/>
             <a:ext cx="5401939" cy="1200329"/>
           </a:xfrm>
           <a:prstGeom prst="rect">
@@ -10678,12 +11004,9 @@
 </file>
 
 <file path=customXml/item1.xml><?xml version="1.0" encoding="utf-8"?>
-<?mso-contentType ?>
-<FormTemplates xmlns="http://schemas.microsoft.com/sharepoint/v3/contenttype/forms">
-  <Display>DocumentLibraryForm</Display>
-  <Edit>DocumentLibraryForm</Edit>
-  <New>DocumentLibraryForm</New>
-</FormTemplates>
+<p:properties xmlns:p="http://schemas.microsoft.com/office/2006/metadata/properties" xmlns:xsi="http://www.w3.org/2001/XMLSchema-instance" xmlns:pc="http://schemas.microsoft.com/office/infopath/2007/PartnerControls">
+  <documentManagement/>
+</p:properties>
 </file>
 
 <file path=customXml/item2.xml><?xml version="1.0" encoding="utf-8"?>
@@ -10801,15 +11124,27 @@
 </file>
 
 <file path=customXml/item3.xml><?xml version="1.0" encoding="utf-8"?>
-<p:properties xmlns:p="http://schemas.microsoft.com/office/2006/metadata/properties" xmlns:xsi="http://www.w3.org/2001/XMLSchema-instance" xmlns:pc="http://schemas.microsoft.com/office/infopath/2007/PartnerControls">
-  <documentManagement/>
-</p:properties>
+<?mso-contentType ?>
+<FormTemplates xmlns="http://schemas.microsoft.com/sharepoint/v3/contenttype/forms">
+  <Display>DocumentLibraryForm</Display>
+  <Edit>DocumentLibraryForm</Edit>
+  <New>DocumentLibraryForm</New>
+</FormTemplates>
 </file>
 
 <file path=customXml/itemProps1.xml><?xml version="1.0" encoding="utf-8"?>
-<ds:datastoreItem xmlns:ds="http://schemas.openxmlformats.org/officeDocument/2006/customXml" ds:itemID="{D03F60F6-267C-4F0B-90AC-53495EF22DB8}">
+<ds:datastoreItem xmlns:ds="http://schemas.openxmlformats.org/officeDocument/2006/customXml" ds:itemID="{19C64E80-8200-4669-BC3C-EA57A9064010}">
   <ds:schemaRefs>
-    <ds:schemaRef ds:uri="http://schemas.microsoft.com/sharepoint/v3/contenttype/forms"/>
+    <ds:schemaRef ds:uri="http://schemas.microsoft.com/office/infopath/2007/PartnerControls"/>
+    <ds:schemaRef ds:uri="http://schemas.openxmlformats.org/package/2006/metadata/core-properties"/>
+    <ds:schemaRef ds:uri="56123433-40cc-482a-838d-44eebed83084"/>
+    <ds:schemaRef ds:uri="http://purl.org/dc/elements/1.1/"/>
+    <ds:schemaRef ds:uri="http://purl.org/dc/dcmitype/"/>
+    <ds:schemaRef ds:uri="7d2247ee-dcae-49b5-8e6a-08fc19cc9b93"/>
+    <ds:schemaRef ds:uri="http://schemas.microsoft.com/office/2006/documentManagement/types"/>
+    <ds:schemaRef ds:uri="http://schemas.microsoft.com/office/2006/metadata/properties"/>
+    <ds:schemaRef ds:uri="http://www.w3.org/XML/1998/namespace"/>
+    <ds:schemaRef ds:uri="http://purl.org/dc/terms/"/>
   </ds:schemaRefs>
 </ds:datastoreItem>
 </file>
@@ -10831,18 +11166,9 @@
 </file>
 
 <file path=customXml/itemProps3.xml><?xml version="1.0" encoding="utf-8"?>
-<ds:datastoreItem xmlns:ds="http://schemas.openxmlformats.org/officeDocument/2006/customXml" ds:itemID="{19C64E80-8200-4669-BC3C-EA57A9064010}">
+<ds:datastoreItem xmlns:ds="http://schemas.openxmlformats.org/officeDocument/2006/customXml" ds:itemID="{D03F60F6-267C-4F0B-90AC-53495EF22DB8}">
   <ds:schemaRefs>
-    <ds:schemaRef ds:uri="http://schemas.microsoft.com/office/infopath/2007/PartnerControls"/>
-    <ds:schemaRef ds:uri="http://schemas.openxmlformats.org/package/2006/metadata/core-properties"/>
-    <ds:schemaRef ds:uri="56123433-40cc-482a-838d-44eebed83084"/>
-    <ds:schemaRef ds:uri="http://purl.org/dc/elements/1.1/"/>
-    <ds:schemaRef ds:uri="http://purl.org/dc/dcmitype/"/>
-    <ds:schemaRef ds:uri="7d2247ee-dcae-49b5-8e6a-08fc19cc9b93"/>
-    <ds:schemaRef ds:uri="http://schemas.microsoft.com/office/2006/documentManagement/types"/>
-    <ds:schemaRef ds:uri="http://schemas.microsoft.com/office/2006/metadata/properties"/>
-    <ds:schemaRef ds:uri="http://www.w3.org/XML/1998/namespace"/>
-    <ds:schemaRef ds:uri="http://purl.org/dc/terms/"/>
+    <ds:schemaRef ds:uri="http://schemas.microsoft.com/sharepoint/v3/contenttype/forms"/>
   </ds:schemaRefs>
 </ds:datastoreItem>
 </file>
</xml_diff>

<commit_message>
update to success plan
</commit_message>
<xml_diff>
--- a/filesets/success_plan/success_plan.pptx
+++ b/filesets/success_plan/success_plan.pptx
@@ -5,20 +5,21 @@
     <p:sldMasterId id="2147483765" r:id="rId4"/>
   </p:sldMasterIdLst>
   <p:notesMasterIdLst>
-    <p:notesMasterId r:id="rId13"/>
+    <p:notesMasterId r:id="rId14"/>
   </p:notesMasterIdLst>
   <p:handoutMasterIdLst>
-    <p:handoutMasterId r:id="rId14"/>
+    <p:handoutMasterId r:id="rId15"/>
   </p:handoutMasterIdLst>
   <p:sldIdLst>
-    <p:sldId id="288" r:id="rId5"/>
-    <p:sldId id="2139119242" r:id="rId6"/>
-    <p:sldId id="2139119243" r:id="rId7"/>
-    <p:sldId id="2139119244" r:id="rId8"/>
-    <p:sldId id="2139119245" r:id="rId9"/>
-    <p:sldId id="295" r:id="rId10"/>
-    <p:sldId id="2139119240" r:id="rId11"/>
-    <p:sldId id="2139119239" r:id="rId12"/>
+    <p:sldId id="2139118629" r:id="rId5"/>
+    <p:sldId id="288" r:id="rId6"/>
+    <p:sldId id="2139119242" r:id="rId7"/>
+    <p:sldId id="2139119243" r:id="rId8"/>
+    <p:sldId id="2139119244" r:id="rId9"/>
+    <p:sldId id="2139119245" r:id="rId10"/>
+    <p:sldId id="295" r:id="rId11"/>
+    <p:sldId id="2139119240" r:id="rId12"/>
+    <p:sldId id="2139119239" r:id="rId13"/>
   </p:sldIdLst>
   <p:sldSz cx="12192000" cy="6858000"/>
   <p:notesSz cx="6858000" cy="9144000"/>
@@ -237,7 +238,7 @@
               <a:rPr lang="en-US" smtClean="0">
                 <a:latin typeface="Arial Regular"/>
               </a:rPr>
-              <a:t>6/25/20</a:t>
+              <a:t>6/29/20</a:t>
             </a:fld>
             <a:endParaRPr lang="en-US" dirty="0">
               <a:latin typeface="Arial Regular"/>
@@ -427,7 +428,7 @@
             <a:fld id="{C7103FDF-5845-2441-8890-D723FF5A85D0}" type="datetimeFigureOut">
               <a:rPr lang="en-US" smtClean="0"/>
               <a:pPr/>
-              <a:t>6/25/20</a:t>
+              <a:t>6/29/20</a:t>
             </a:fld>
             <a:endParaRPr lang="en-US" dirty="0"/>
           </a:p>
@@ -793,7 +794,7 @@
             <a:fld id="{FFDCFA53-E6C0-FD4E-82A8-4284543D7962}" type="slidenum">
               <a:rPr lang="en-US" smtClean="0"/>
               <a:pPr/>
-              <a:t>7</a:t>
+              <a:t>8</a:t>
             </a:fld>
             <a:endParaRPr lang="en-US"/>
           </a:p>
@@ -878,7 +879,7 @@
             <a:fld id="{FFDCFA53-E6C0-FD4E-82A8-4284543D7962}" type="slidenum">
               <a:rPr lang="en-US" smtClean="0"/>
               <a:pPr/>
-              <a:t>8</a:t>
+              <a:t>9</a:t>
             </a:fld>
             <a:endParaRPr lang="en-US"/>
           </a:p>
@@ -4920,6 +4921,132 @@
       </p:grpSpPr>
       <p:sp>
         <p:nvSpPr>
+          <p:cNvPr id="3" name="Title 2">
+            <a:extLst>
+              <a:ext uri="{FF2B5EF4-FFF2-40B4-BE49-F238E27FC236}">
+                <a16:creationId xmlns:a16="http://schemas.microsoft.com/office/drawing/2014/main" id="{C8AAC075-E97C-C042-9780-EC090B8EBFE3}"/>
+              </a:ext>
+            </a:extLst>
+          </p:cNvPr>
+          <p:cNvSpPr>
+            <a:spLocks noGrp="1"/>
+          </p:cNvSpPr>
+          <p:nvPr>
+            <p:ph type="title"/>
+          </p:nvPr>
+        </p:nvSpPr>
+        <p:spPr>
+          <a:xfrm>
+            <a:off x="100594" y="184056"/>
+            <a:ext cx="10515600" cy="507033"/>
+          </a:xfrm>
+        </p:spPr>
+        <p:txBody>
+          <a:bodyPr/>
+          <a:lstStyle/>
+          <a:p>
+            <a:r>
+              <a:rPr lang="en-US" dirty="0"/>
+              <a:t>Status Updates</a:t>
+            </a:r>
+          </a:p>
+        </p:txBody>
+      </p:sp>
+      <p:graphicFrame>
+        <p:nvGraphicFramePr>
+          <p:cNvPr id="4" name="Object 3">
+            <a:extLst>
+              <a:ext uri="{FF2B5EF4-FFF2-40B4-BE49-F238E27FC236}">
+                <a16:creationId xmlns:a16="http://schemas.microsoft.com/office/drawing/2014/main" id="{5EA68C9E-C94E-5546-B903-9E009C28B73D}"/>
+              </a:ext>
+            </a:extLst>
+          </p:cNvPr>
+          <p:cNvGraphicFramePr>
+            <a:graphicFrameLocks noChangeAspect="1"/>
+          </p:cNvGraphicFramePr>
+          <p:nvPr/>
+        </p:nvGraphicFramePr>
+        <p:xfrm>
+          <a:off x="463654" y="866898"/>
+          <a:ext cx="11264691" cy="5553529"/>
+        </p:xfrm>
+        <a:graphic>
+          <a:graphicData uri="http://schemas.openxmlformats.org/presentationml/2006/ole">
+            <mc:AlternateContent xmlns:mc="http://schemas.openxmlformats.org/markup-compatibility/2006">
+              <mc:Choice xmlns:v="urn:schemas-microsoft-com:vml" Requires="v">
+                <p:oleObj spid="_x0000_s1027" name="Worksheet" r:id="rId3" imgW="11798300" imgH="5816600" progId="Excel.Sheet.12">
+                  <p:embed/>
+                </p:oleObj>
+              </mc:Choice>
+              <mc:Fallback>
+                <p:oleObj name="Worksheet" r:id="rId3" imgW="11798300" imgH="5816600" progId="Excel.Sheet.12">
+                  <p:embed/>
+                  <p:pic>
+                    <p:nvPicPr>
+                      <p:cNvPr id="4" name="Object 3">
+                        <a:extLst>
+                          <a:ext uri="{FF2B5EF4-FFF2-40B4-BE49-F238E27FC236}">
+                            <a16:creationId xmlns:a16="http://schemas.microsoft.com/office/drawing/2014/main" id="{5EA68C9E-C94E-5546-B903-9E009C28B73D}"/>
+                          </a:ext>
+                        </a:extLst>
+                      </p:cNvPr>
+                      <p:cNvPicPr/>
+                      <p:nvPr/>
+                    </p:nvPicPr>
+                    <p:blipFill>
+                      <a:blip r:embed="rId4"/>
+                      <a:stretch>
+                        <a:fillRect/>
+                      </a:stretch>
+                    </p:blipFill>
+                    <p:spPr>
+                      <a:xfrm>
+                        <a:off x="463654" y="866898"/>
+                        <a:ext cx="11264691" cy="5553529"/>
+                      </a:xfrm>
+                      <a:prstGeom prst="rect">
+                        <a:avLst/>
+                      </a:prstGeom>
+                    </p:spPr>
+                  </p:pic>
+                </p:oleObj>
+              </mc:Fallback>
+            </mc:AlternateContent>
+          </a:graphicData>
+        </a:graphic>
+      </p:graphicFrame>
+    </p:spTree>
+    <p:extLst>
+      <p:ext uri="{BB962C8B-B14F-4D97-AF65-F5344CB8AC3E}">
+        <p14:creationId xmlns:p14="http://schemas.microsoft.com/office/powerpoint/2010/main" val="2482411873"/>
+      </p:ext>
+    </p:extLst>
+  </p:cSld>
+  <p:clrMapOvr>
+    <a:masterClrMapping/>
+  </p:clrMapOvr>
+</p:sld>
+</file>
+
+<file path=ppt/slides/slide2.xml><?xml version="1.0" encoding="utf-8"?>
+<p:sld xmlns:a="http://schemas.openxmlformats.org/drawingml/2006/main" xmlns:r="http://schemas.openxmlformats.org/officeDocument/2006/relationships" xmlns:p="http://schemas.openxmlformats.org/presentationml/2006/main">
+  <p:cSld>
+    <p:spTree>
+      <p:nvGrpSpPr>
+        <p:cNvPr id="1" name=""/>
+        <p:cNvGrpSpPr/>
+        <p:nvPr/>
+      </p:nvGrpSpPr>
+      <p:grpSpPr>
+        <a:xfrm>
+          <a:off x="0" y="0"/>
+          <a:ext cx="0" cy="0"/>
+          <a:chOff x="0" y="0"/>
+          <a:chExt cx="0" cy="0"/>
+        </a:xfrm>
+      </p:grpSpPr>
+      <p:sp>
+        <p:nvSpPr>
           <p:cNvPr id="2" name="Title 1">
             <a:extLst>
               <a:ext uri="{FF2B5EF4-FFF2-40B4-BE49-F238E27FC236}">
@@ -6595,7 +6722,7 @@
 </p:sld>
 </file>
 
-<file path=ppt/slides/slide2.xml><?xml version="1.0" encoding="utf-8"?>
+<file path=ppt/slides/slide3.xml><?xml version="1.0" encoding="utf-8"?>
 <p:sld xmlns:a="http://schemas.openxmlformats.org/drawingml/2006/main" xmlns:r="http://schemas.openxmlformats.org/officeDocument/2006/relationships" xmlns:p="http://schemas.openxmlformats.org/presentationml/2006/main">
   <p:cSld>
     <p:spTree>
@@ -7232,7 +7359,7 @@
 </p:sld>
 </file>
 
-<file path=ppt/slides/slide3.xml><?xml version="1.0" encoding="utf-8"?>
+<file path=ppt/slides/slide4.xml><?xml version="1.0" encoding="utf-8"?>
 <p:sld xmlns:a="http://schemas.openxmlformats.org/drawingml/2006/main" xmlns:r="http://schemas.openxmlformats.org/officeDocument/2006/relationships" xmlns:p="http://schemas.openxmlformats.org/presentationml/2006/main">
   <p:cSld>
     <p:spTree>
@@ -7449,282 +7576,6 @@
     <p:extLst>
       <p:ext uri="{BB962C8B-B14F-4D97-AF65-F5344CB8AC3E}">
         <p14:creationId xmlns:p14="http://schemas.microsoft.com/office/powerpoint/2010/main" val="3369628375"/>
-      </p:ext>
-    </p:extLst>
-  </p:cSld>
-  <p:clrMapOvr>
-    <a:masterClrMapping/>
-  </p:clrMapOvr>
-</p:sld>
-</file>
-
-<file path=ppt/slides/slide4.xml><?xml version="1.0" encoding="utf-8"?>
-<p:sld xmlns:a="http://schemas.openxmlformats.org/drawingml/2006/main" xmlns:r="http://schemas.openxmlformats.org/officeDocument/2006/relationships" xmlns:p="http://schemas.openxmlformats.org/presentationml/2006/main">
-  <p:cSld>
-    <p:spTree>
-      <p:nvGrpSpPr>
-        <p:cNvPr id="1" name=""/>
-        <p:cNvGrpSpPr/>
-        <p:nvPr/>
-      </p:nvGrpSpPr>
-      <p:grpSpPr>
-        <a:xfrm>
-          <a:off x="0" y="0"/>
-          <a:ext cx="0" cy="0"/>
-          <a:chOff x="0" y="0"/>
-          <a:chExt cx="0" cy="0"/>
-        </a:xfrm>
-      </p:grpSpPr>
-      <p:sp>
-        <p:nvSpPr>
-          <p:cNvPr id="2" name="Title 1">
-            <a:extLst>
-              <a:ext uri="{FF2B5EF4-FFF2-40B4-BE49-F238E27FC236}">
-                <a16:creationId xmlns:a16="http://schemas.microsoft.com/office/drawing/2014/main" id="{A64C6211-6D28-D242-95D0-D5CDE6AB46D1}"/>
-              </a:ext>
-            </a:extLst>
-          </p:cNvPr>
-          <p:cNvSpPr>
-            <a:spLocks noGrp="1"/>
-          </p:cNvSpPr>
-          <p:nvPr>
-            <p:ph type="title"/>
-          </p:nvPr>
-        </p:nvSpPr>
-        <p:spPr/>
-        <p:txBody>
-          <a:bodyPr/>
-          <a:lstStyle/>
-          <a:p>
-            <a:r>
-              <a:rPr lang="en-US" dirty="0"/>
-              <a:t>Concurrency</a:t>
-            </a:r>
-          </a:p>
-        </p:txBody>
-      </p:sp>
-      <p:sp>
-        <p:nvSpPr>
-          <p:cNvPr id="4" name="Rectangle 3">
-            <a:extLst>
-              <a:ext uri="{FF2B5EF4-FFF2-40B4-BE49-F238E27FC236}">
-                <a16:creationId xmlns:a16="http://schemas.microsoft.com/office/drawing/2014/main" id="{35FD92CC-58BF-A243-B4A9-F89D1A8287C9}"/>
-              </a:ext>
-            </a:extLst>
-          </p:cNvPr>
-          <p:cNvSpPr/>
-          <p:nvPr/>
-        </p:nvSpPr>
-        <p:spPr>
-          <a:xfrm>
-            <a:off x="431320" y="1407863"/>
-            <a:ext cx="6531340" cy="4864342"/>
-          </a:xfrm>
-          <a:prstGeom prst="rect">
-            <a:avLst/>
-          </a:prstGeom>
-        </p:spPr>
-        <p:style>
-          <a:lnRef idx="2">
-            <a:schemeClr val="accent1">
-              <a:shade val="50000"/>
-            </a:schemeClr>
-          </a:lnRef>
-          <a:fillRef idx="1">
-            <a:schemeClr val="accent1"/>
-          </a:fillRef>
-          <a:effectRef idx="0">
-            <a:schemeClr val="accent1"/>
-          </a:effectRef>
-          <a:fontRef idx="minor">
-            <a:schemeClr val="lt1"/>
-          </a:fontRef>
-        </p:style>
-        <p:txBody>
-          <a:bodyPr rtlCol="0" anchor="ctr"/>
-          <a:lstStyle/>
-          <a:p>
-            <a:pPr algn="ctr"/>
-            <a:r>
-              <a:rPr lang="en-US" dirty="0"/>
-              <a:t>{{</a:t>
-            </a:r>
-            <a:r>
-              <a:rPr lang="en-US" dirty="0" err="1"/>
-              <a:t>pic:concurrency.comparative_line_trend_graph.png</a:t>
-            </a:r>
-            <a:r>
-              <a:rPr lang="en-US" dirty="0"/>
-              <a:t>}}</a:t>
-            </a:r>
-          </a:p>
-        </p:txBody>
-      </p:sp>
-      <p:sp>
-        <p:nvSpPr>
-          <p:cNvPr id="6" name="Rectangle 5">
-            <a:extLst>
-              <a:ext uri="{FF2B5EF4-FFF2-40B4-BE49-F238E27FC236}">
-                <a16:creationId xmlns:a16="http://schemas.microsoft.com/office/drawing/2014/main" id="{C4BCA0CE-B368-6A49-BB80-E9733E536BDF}"/>
-              </a:ext>
-            </a:extLst>
-          </p:cNvPr>
-          <p:cNvSpPr/>
-          <p:nvPr/>
-        </p:nvSpPr>
-        <p:spPr>
-          <a:xfrm>
-            <a:off x="10255255" y="98415"/>
-            <a:ext cx="1828800" cy="914400"/>
-          </a:xfrm>
-          <a:prstGeom prst="rect">
-            <a:avLst/>
-          </a:prstGeom>
-        </p:spPr>
-        <p:style>
-          <a:lnRef idx="2">
-            <a:schemeClr val="accent1">
-              <a:shade val="50000"/>
-            </a:schemeClr>
-          </a:lnRef>
-          <a:fillRef idx="1">
-            <a:schemeClr val="accent1"/>
-          </a:fillRef>
-          <a:effectRef idx="0">
-            <a:schemeClr val="accent1"/>
-          </a:effectRef>
-          <a:fontRef idx="minor">
-            <a:schemeClr val="lt1"/>
-          </a:fontRef>
-        </p:style>
-        <p:txBody>
-          <a:bodyPr rtlCol="0" anchor="ctr"/>
-          <a:lstStyle/>
-          <a:p>
-            <a:pPr algn="ctr"/>
-            <a:r>
-              <a:rPr lang="en-US" dirty="0"/>
-              <a:t>{{</a:t>
-            </a:r>
-            <a:r>
-              <a:rPr lang="en-US" dirty="0" err="1"/>
-              <a:t>pic:logo.png</a:t>
-            </a:r>
-            <a:r>
-              <a:rPr lang="en-US" dirty="0"/>
-              <a:t>}}</a:t>
-            </a:r>
-          </a:p>
-        </p:txBody>
-      </p:sp>
-      <p:sp>
-        <p:nvSpPr>
-          <p:cNvPr id="7" name="TextBox 6">
-            <a:extLst>
-              <a:ext uri="{FF2B5EF4-FFF2-40B4-BE49-F238E27FC236}">
-                <a16:creationId xmlns:a16="http://schemas.microsoft.com/office/drawing/2014/main" id="{A5B7A820-D532-6842-85E4-56D762FDD921}"/>
-              </a:ext>
-            </a:extLst>
-          </p:cNvPr>
-          <p:cNvSpPr txBox="1"/>
-          <p:nvPr/>
-        </p:nvSpPr>
-        <p:spPr>
-          <a:xfrm>
-            <a:off x="7304183" y="1994511"/>
-            <a:ext cx="4638099" cy="2031325"/>
-          </a:xfrm>
-          <a:prstGeom prst="rect">
-            <a:avLst/>
-          </a:prstGeom>
-          <a:noFill/>
-          <a:ln>
-            <a:solidFill>
-              <a:schemeClr val="accent3"/>
-            </a:solidFill>
-          </a:ln>
-        </p:spPr>
-        <p:txBody>
-          <a:bodyPr wrap="square" rtlCol="0">
-            <a:spAutoFit/>
-          </a:bodyPr>
-          <a:lstStyle/>
-          <a:p>
-            <a:pPr marL="285750" indent="-285750">
-              <a:buFont typeface="Arial" panose="020B0604020202020204" pitchFamily="34" charset="0"/>
-              <a:buChar char="•"/>
-            </a:pPr>
-            <a:r>
-              <a:rPr lang="en-US" dirty="0"/>
-              <a:t>Observations:</a:t>
-            </a:r>
-          </a:p>
-          <a:p>
-            <a:pPr marL="742950" lvl="1" indent="-285750">
-              <a:buFont typeface="Arial" panose="020B0604020202020204" pitchFamily="34" charset="0"/>
-              <a:buChar char="•"/>
-            </a:pPr>
-            <a:r>
-              <a:rPr lang="en-US" dirty="0"/>
-              <a:t>Stuff</a:t>
-            </a:r>
-          </a:p>
-          <a:p>
-            <a:pPr marL="742950" lvl="1" indent="-285750">
-              <a:buFont typeface="Arial" panose="020B0604020202020204" pitchFamily="34" charset="0"/>
-              <a:buChar char="•"/>
-            </a:pPr>
-            <a:r>
-              <a:rPr lang="en-US" dirty="0"/>
-              <a:t>Things</a:t>
-            </a:r>
-          </a:p>
-          <a:p>
-            <a:pPr marL="742950" lvl="1" indent="-285750">
-              <a:buFont typeface="Arial" panose="020B0604020202020204" pitchFamily="34" charset="0"/>
-              <a:buChar char="•"/>
-            </a:pPr>
-            <a:r>
-              <a:rPr lang="en-US" dirty="0"/>
-              <a:t>Other Junk</a:t>
-            </a:r>
-          </a:p>
-          <a:p>
-            <a:pPr marL="285750" indent="-285750">
-              <a:buFont typeface="Arial" panose="020B0604020202020204" pitchFamily="34" charset="0"/>
-              <a:buChar char="•"/>
-            </a:pPr>
-            <a:r>
-              <a:rPr lang="en-US" dirty="0"/>
-              <a:t>Recommendations:</a:t>
-            </a:r>
-          </a:p>
-          <a:p>
-            <a:pPr marL="742950" lvl="1" indent="-285750">
-              <a:buFont typeface="Arial" panose="020B0604020202020204" pitchFamily="34" charset="0"/>
-              <a:buChar char="•"/>
-            </a:pPr>
-            <a:r>
-              <a:rPr lang="en-US" dirty="0"/>
-              <a:t>Stuff </a:t>
-            </a:r>
-          </a:p>
-          <a:p>
-            <a:pPr marL="742950" lvl="1" indent="-285750">
-              <a:buFont typeface="Arial" panose="020B0604020202020204" pitchFamily="34" charset="0"/>
-              <a:buChar char="•"/>
-            </a:pPr>
-            <a:r>
-              <a:rPr lang="en-US" dirty="0"/>
-              <a:t>Things</a:t>
-            </a:r>
-          </a:p>
-        </p:txBody>
-      </p:sp>
-    </p:spTree>
-    <p:extLst>
-      <p:ext uri="{BB962C8B-B14F-4D97-AF65-F5344CB8AC3E}">
-        <p14:creationId xmlns:p14="http://schemas.microsoft.com/office/powerpoint/2010/main" val="2762313729"/>
       </p:ext>
     </p:extLst>
   </p:cSld>
@@ -7774,7 +7625,64 @@
           <a:p>
             <a:r>
               <a:rPr lang="en-US" dirty="0"/>
-              <a:t>Top 10 Databases</a:t>
+              <a:t>Concurrency</a:t>
+            </a:r>
+          </a:p>
+        </p:txBody>
+      </p:sp>
+      <p:sp>
+        <p:nvSpPr>
+          <p:cNvPr id="4" name="Rectangle 3">
+            <a:extLst>
+              <a:ext uri="{FF2B5EF4-FFF2-40B4-BE49-F238E27FC236}">
+                <a16:creationId xmlns:a16="http://schemas.microsoft.com/office/drawing/2014/main" id="{35FD92CC-58BF-A243-B4A9-F89D1A8287C9}"/>
+              </a:ext>
+            </a:extLst>
+          </p:cNvPr>
+          <p:cNvSpPr/>
+          <p:nvPr/>
+        </p:nvSpPr>
+        <p:spPr>
+          <a:xfrm>
+            <a:off x="431320" y="1407863"/>
+            <a:ext cx="6531340" cy="4864342"/>
+          </a:xfrm>
+          <a:prstGeom prst="rect">
+            <a:avLst/>
+          </a:prstGeom>
+        </p:spPr>
+        <p:style>
+          <a:lnRef idx="2">
+            <a:schemeClr val="accent1">
+              <a:shade val="50000"/>
+            </a:schemeClr>
+          </a:lnRef>
+          <a:fillRef idx="1">
+            <a:schemeClr val="accent1"/>
+          </a:fillRef>
+          <a:effectRef idx="0">
+            <a:schemeClr val="accent1"/>
+          </a:effectRef>
+          <a:fontRef idx="minor">
+            <a:schemeClr val="lt1"/>
+          </a:fontRef>
+        </p:style>
+        <p:txBody>
+          <a:bodyPr rtlCol="0" anchor="ctr"/>
+          <a:lstStyle/>
+          <a:p>
+            <a:pPr algn="ctr"/>
+            <a:r>
+              <a:rPr lang="en-US" dirty="0"/>
+              <a:t>{{</a:t>
+            </a:r>
+            <a:r>
+              <a:rPr lang="en-US" dirty="0" err="1"/>
+              <a:t>pic:concurrency.comparative_line_trend_graph.png</a:t>
+            </a:r>
+            <a:r>
+              <a:rPr lang="en-US" dirty="0"/>
+              <a:t>}}</a:t>
             </a:r>
           </a:p>
         </p:txBody>
@@ -7850,6 +7758,225 @@
         </p:nvSpPr>
         <p:spPr>
           <a:xfrm>
+            <a:off x="7304183" y="1994511"/>
+            <a:ext cx="4638099" cy="2031325"/>
+          </a:xfrm>
+          <a:prstGeom prst="rect">
+            <a:avLst/>
+          </a:prstGeom>
+          <a:noFill/>
+          <a:ln>
+            <a:solidFill>
+              <a:schemeClr val="accent3"/>
+            </a:solidFill>
+          </a:ln>
+        </p:spPr>
+        <p:txBody>
+          <a:bodyPr wrap="square" rtlCol="0">
+            <a:spAutoFit/>
+          </a:bodyPr>
+          <a:lstStyle/>
+          <a:p>
+            <a:pPr marL="285750" indent="-285750">
+              <a:buFont typeface="Arial" panose="020B0604020202020204" pitchFamily="34" charset="0"/>
+              <a:buChar char="•"/>
+            </a:pPr>
+            <a:r>
+              <a:rPr lang="en-US" dirty="0"/>
+              <a:t>Observations:</a:t>
+            </a:r>
+          </a:p>
+          <a:p>
+            <a:pPr marL="742950" lvl="1" indent="-285750">
+              <a:buFont typeface="Arial" panose="020B0604020202020204" pitchFamily="34" charset="0"/>
+              <a:buChar char="•"/>
+            </a:pPr>
+            <a:r>
+              <a:rPr lang="en-US" dirty="0"/>
+              <a:t>Stuff</a:t>
+            </a:r>
+          </a:p>
+          <a:p>
+            <a:pPr marL="742950" lvl="1" indent="-285750">
+              <a:buFont typeface="Arial" panose="020B0604020202020204" pitchFamily="34" charset="0"/>
+              <a:buChar char="•"/>
+            </a:pPr>
+            <a:r>
+              <a:rPr lang="en-US" dirty="0"/>
+              <a:t>Things</a:t>
+            </a:r>
+          </a:p>
+          <a:p>
+            <a:pPr marL="742950" lvl="1" indent="-285750">
+              <a:buFont typeface="Arial" panose="020B0604020202020204" pitchFamily="34" charset="0"/>
+              <a:buChar char="•"/>
+            </a:pPr>
+            <a:r>
+              <a:rPr lang="en-US" dirty="0"/>
+              <a:t>Other Junk</a:t>
+            </a:r>
+          </a:p>
+          <a:p>
+            <a:pPr marL="285750" indent="-285750">
+              <a:buFont typeface="Arial" panose="020B0604020202020204" pitchFamily="34" charset="0"/>
+              <a:buChar char="•"/>
+            </a:pPr>
+            <a:r>
+              <a:rPr lang="en-US" dirty="0"/>
+              <a:t>Recommendations:</a:t>
+            </a:r>
+          </a:p>
+          <a:p>
+            <a:pPr marL="742950" lvl="1" indent="-285750">
+              <a:buFont typeface="Arial" panose="020B0604020202020204" pitchFamily="34" charset="0"/>
+              <a:buChar char="•"/>
+            </a:pPr>
+            <a:r>
+              <a:rPr lang="en-US" dirty="0"/>
+              <a:t>Stuff </a:t>
+            </a:r>
+          </a:p>
+          <a:p>
+            <a:pPr marL="742950" lvl="1" indent="-285750">
+              <a:buFont typeface="Arial" panose="020B0604020202020204" pitchFamily="34" charset="0"/>
+              <a:buChar char="•"/>
+            </a:pPr>
+            <a:r>
+              <a:rPr lang="en-US" dirty="0"/>
+              <a:t>Things</a:t>
+            </a:r>
+          </a:p>
+        </p:txBody>
+      </p:sp>
+    </p:spTree>
+    <p:extLst>
+      <p:ext uri="{BB962C8B-B14F-4D97-AF65-F5344CB8AC3E}">
+        <p14:creationId xmlns:p14="http://schemas.microsoft.com/office/powerpoint/2010/main" val="2762313729"/>
+      </p:ext>
+    </p:extLst>
+  </p:cSld>
+  <p:clrMapOvr>
+    <a:masterClrMapping/>
+  </p:clrMapOvr>
+</p:sld>
+</file>
+
+<file path=ppt/slides/slide6.xml><?xml version="1.0" encoding="utf-8"?>
+<p:sld xmlns:a="http://schemas.openxmlformats.org/drawingml/2006/main" xmlns:r="http://schemas.openxmlformats.org/officeDocument/2006/relationships" xmlns:p="http://schemas.openxmlformats.org/presentationml/2006/main">
+  <p:cSld>
+    <p:spTree>
+      <p:nvGrpSpPr>
+        <p:cNvPr id="1" name=""/>
+        <p:cNvGrpSpPr/>
+        <p:nvPr/>
+      </p:nvGrpSpPr>
+      <p:grpSpPr>
+        <a:xfrm>
+          <a:off x="0" y="0"/>
+          <a:ext cx="0" cy="0"/>
+          <a:chOff x="0" y="0"/>
+          <a:chExt cx="0" cy="0"/>
+        </a:xfrm>
+      </p:grpSpPr>
+      <p:sp>
+        <p:nvSpPr>
+          <p:cNvPr id="2" name="Title 1">
+            <a:extLst>
+              <a:ext uri="{FF2B5EF4-FFF2-40B4-BE49-F238E27FC236}">
+                <a16:creationId xmlns:a16="http://schemas.microsoft.com/office/drawing/2014/main" id="{A64C6211-6D28-D242-95D0-D5CDE6AB46D1}"/>
+              </a:ext>
+            </a:extLst>
+          </p:cNvPr>
+          <p:cNvSpPr>
+            <a:spLocks noGrp="1"/>
+          </p:cNvSpPr>
+          <p:nvPr>
+            <p:ph type="title"/>
+          </p:nvPr>
+        </p:nvSpPr>
+        <p:spPr/>
+        <p:txBody>
+          <a:bodyPr/>
+          <a:lstStyle/>
+          <a:p>
+            <a:r>
+              <a:rPr lang="en-US" dirty="0"/>
+              <a:t>Top 10 Databases</a:t>
+            </a:r>
+          </a:p>
+        </p:txBody>
+      </p:sp>
+      <p:sp>
+        <p:nvSpPr>
+          <p:cNvPr id="6" name="Rectangle 5">
+            <a:extLst>
+              <a:ext uri="{FF2B5EF4-FFF2-40B4-BE49-F238E27FC236}">
+                <a16:creationId xmlns:a16="http://schemas.microsoft.com/office/drawing/2014/main" id="{C4BCA0CE-B368-6A49-BB80-E9733E536BDF}"/>
+              </a:ext>
+            </a:extLst>
+          </p:cNvPr>
+          <p:cNvSpPr/>
+          <p:nvPr/>
+        </p:nvSpPr>
+        <p:spPr>
+          <a:xfrm>
+            <a:off x="10255255" y="98415"/>
+            <a:ext cx="1828800" cy="914400"/>
+          </a:xfrm>
+          <a:prstGeom prst="rect">
+            <a:avLst/>
+          </a:prstGeom>
+        </p:spPr>
+        <p:style>
+          <a:lnRef idx="2">
+            <a:schemeClr val="accent1">
+              <a:shade val="50000"/>
+            </a:schemeClr>
+          </a:lnRef>
+          <a:fillRef idx="1">
+            <a:schemeClr val="accent1"/>
+          </a:fillRef>
+          <a:effectRef idx="0">
+            <a:schemeClr val="accent1"/>
+          </a:effectRef>
+          <a:fontRef idx="minor">
+            <a:schemeClr val="lt1"/>
+          </a:fontRef>
+        </p:style>
+        <p:txBody>
+          <a:bodyPr rtlCol="0" anchor="ctr"/>
+          <a:lstStyle/>
+          <a:p>
+            <a:pPr algn="ctr"/>
+            <a:r>
+              <a:rPr lang="en-US" dirty="0"/>
+              <a:t>{{</a:t>
+            </a:r>
+            <a:r>
+              <a:rPr lang="en-US" dirty="0" err="1"/>
+              <a:t>pic:logo.png</a:t>
+            </a:r>
+            <a:r>
+              <a:rPr lang="en-US" dirty="0"/>
+              <a:t>}}</a:t>
+            </a:r>
+          </a:p>
+        </p:txBody>
+      </p:sp>
+      <p:sp>
+        <p:nvSpPr>
+          <p:cNvPr id="7" name="TextBox 6">
+            <a:extLst>
+              <a:ext uri="{FF2B5EF4-FFF2-40B4-BE49-F238E27FC236}">
+                <a16:creationId xmlns:a16="http://schemas.microsoft.com/office/drawing/2014/main" id="{A5B7A820-D532-6842-85E4-56D762FDD921}"/>
+              </a:ext>
+            </a:extLst>
+          </p:cNvPr>
+          <p:cNvSpPr txBox="1"/>
+          <p:nvPr/>
+        </p:nvSpPr>
+        <p:spPr>
+          <a:xfrm>
             <a:off x="587481" y="5131142"/>
             <a:ext cx="5508519" cy="1200329"/>
           </a:xfrm>
@@ -7925,14 +8052,14 @@
           <p:nvPr>
             <p:extLst>
               <p:ext uri="{D42A27DB-BD31-4B8C-83A1-F6EECF244321}">
-                <p14:modId xmlns:p14="http://schemas.microsoft.com/office/powerpoint/2010/main" val="2705572930"/>
+                <p14:modId xmlns:p14="http://schemas.microsoft.com/office/powerpoint/2010/main" val="89527698"/>
               </p:ext>
             </p:extLst>
           </p:nvPr>
         </p:nvGraphicFramePr>
         <p:xfrm>
-          <a:off x="587481" y="1287624"/>
-          <a:ext cx="10925150" cy="3601760"/>
+          <a:off x="418641" y="1287624"/>
+          <a:ext cx="11325336" cy="3601760"/>
         </p:xfrm>
         <a:graphic>
           <a:graphicData uri="http://schemas.openxmlformats.org/drawingml/2006/table">
@@ -7941,91 +8068,85 @@
                 <a:tableStyleId>{FABFCF23-3B69-468F-B69F-88F6DE6A72F2}</a:tableStyleId>
               </a:tblPr>
               <a:tblGrid>
-                <a:gridCol w="1092515">
+                <a:gridCol w="1029576">
                   <a:extLst>
                     <a:ext uri="{9D8B030D-6E8A-4147-A177-3AD203B41FA5}">
                       <a16:colId xmlns:a16="http://schemas.microsoft.com/office/drawing/2014/main" val="1021823340"/>
                     </a:ext>
                   </a:extLst>
                 </a:gridCol>
-                <a:gridCol w="1092515">
+                <a:gridCol w="1029576">
                   <a:extLst>
                     <a:ext uri="{9D8B030D-6E8A-4147-A177-3AD203B41FA5}">
                       <a16:colId xmlns:a16="http://schemas.microsoft.com/office/drawing/2014/main" val="4002956159"/>
                     </a:ext>
                   </a:extLst>
                 </a:gridCol>
-                <a:gridCol w="1092515">
+                <a:gridCol w="1029576">
                   <a:extLst>
                     <a:ext uri="{9D8B030D-6E8A-4147-A177-3AD203B41FA5}">
                       <a16:colId xmlns:a16="http://schemas.microsoft.com/office/drawing/2014/main" val="262357997"/>
                     </a:ext>
                   </a:extLst>
                 </a:gridCol>
-                <a:gridCol w="1092515">
+                <a:gridCol w="1029576">
                   <a:extLst>
                     <a:ext uri="{9D8B030D-6E8A-4147-A177-3AD203B41FA5}">
                       <a16:colId xmlns:a16="http://schemas.microsoft.com/office/drawing/2014/main" val="1956989282"/>
                     </a:ext>
                   </a:extLst>
                 </a:gridCol>
-                <a:gridCol w="1092515">
+                <a:gridCol w="1029576">
                   <a:extLst>
                     <a:ext uri="{9D8B030D-6E8A-4147-A177-3AD203B41FA5}">
                       <a16:colId xmlns:a16="http://schemas.microsoft.com/office/drawing/2014/main" val="3155525533"/>
                     </a:ext>
                   </a:extLst>
                 </a:gridCol>
-                <a:gridCol w="1092515">
+                <a:gridCol w="1029576">
                   <a:extLst>
                     <a:ext uri="{9D8B030D-6E8A-4147-A177-3AD203B41FA5}">
                       <a16:colId xmlns:a16="http://schemas.microsoft.com/office/drawing/2014/main" val="2708770844"/>
                     </a:ext>
                   </a:extLst>
                 </a:gridCol>
-                <a:gridCol w="1092515">
+                <a:gridCol w="1029576">
                   <a:extLst>
                     <a:ext uri="{9D8B030D-6E8A-4147-A177-3AD203B41FA5}">
                       <a16:colId xmlns:a16="http://schemas.microsoft.com/office/drawing/2014/main" val="1902436834"/>
                     </a:ext>
                   </a:extLst>
                 </a:gridCol>
-                <a:gridCol w="1092515">
+                <a:gridCol w="1029576">
                   <a:extLst>
                     <a:ext uri="{9D8B030D-6E8A-4147-A177-3AD203B41FA5}">
                       <a16:colId xmlns:a16="http://schemas.microsoft.com/office/drawing/2014/main" val="3082279119"/>
                     </a:ext>
                   </a:extLst>
                 </a:gridCol>
-                <a:gridCol w="1092515">
+                <a:gridCol w="1029576">
                   <a:extLst>
                     <a:ext uri="{9D8B030D-6E8A-4147-A177-3AD203B41FA5}">
                       <a16:colId xmlns:a16="http://schemas.microsoft.com/office/drawing/2014/main" val="3851535888"/>
                     </a:ext>
                   </a:extLst>
                 </a:gridCol>
-                <a:gridCol w="1092515">
+                <a:gridCol w="1029576">
                   <a:extLst>
                     <a:ext uri="{9D8B030D-6E8A-4147-A177-3AD203B41FA5}">
                       <a16:colId xmlns:a16="http://schemas.microsoft.com/office/drawing/2014/main" val="3029171604"/>
                     </a:ext>
                   </a:extLst>
                 </a:gridCol>
+                <a:gridCol w="1029576">
+                  <a:extLst>
+                    <a:ext uri="{9D8B030D-6E8A-4147-A177-3AD203B41FA5}">
+                      <a16:colId xmlns:a16="http://schemas.microsoft.com/office/drawing/2014/main" val="3948935385"/>
+                    </a:ext>
+                  </a:extLst>
+                </a:gridCol>
               </a:tblGrid>
               <a:tr h="443885">
-                <a:tc>
-                  <a:txBody>
-                    <a:bodyPr/>
-                    <a:lstStyle/>
-                    <a:p>
-                      <a:r>
-                        <a:rPr lang="en-US" sz="1200" dirty="0"/>
-                        <a:t>{{col:db_objects_top10.csv[2]}}</a:t>
-                      </a:r>
-                    </a:p>
-                  </a:txBody>
-                  <a:tcPr/>
-                </a:tc>
                 <a:tc>
                   <a:txBody>
                     <a:bodyPr/>
@@ -8046,19 +8167,6 @@
                     <a:p>
                       <a:r>
                         <a:rPr lang="en-US" sz="1200" dirty="0"/>
-                        <a:t>{{col:db_objects_top10.csv[6]}}</a:t>
-                      </a:r>
-                    </a:p>
-                  </a:txBody>
-                  <a:tcPr/>
-                </a:tc>
-                <a:tc>
-                  <a:txBody>
-                    <a:bodyPr/>
-                    <a:lstStyle/>
-                    <a:p>
-                      <a:r>
-                        <a:rPr lang="en-US" sz="1200" dirty="0"/>
                         <a:t>{{col:db_objects_top10.csv[7]}}</a:t>
                       </a:r>
                     </a:p>
@@ -8138,6 +8246,45 @@
                       <a:r>
                         <a:rPr lang="en-US" sz="1200" dirty="0"/>
                         <a:t>{{col:db_objects_top10.csv[13]}}</a:t>
+                      </a:r>
+                    </a:p>
+                  </a:txBody>
+                  <a:tcPr/>
+                </a:tc>
+                <a:tc>
+                  <a:txBody>
+                    <a:bodyPr/>
+                    <a:lstStyle/>
+                    <a:p>
+                      <a:r>
+                        <a:rPr lang="en-US" sz="1200" dirty="0"/>
+                        <a:t>{{col:db_objects_top10.csv[14]}}</a:t>
+                      </a:r>
+                    </a:p>
+                  </a:txBody>
+                  <a:tcPr/>
+                </a:tc>
+                <a:tc>
+                  <a:txBody>
+                    <a:bodyPr/>
+                    <a:lstStyle/>
+                    <a:p>
+                      <a:r>
+                        <a:rPr lang="en-US" sz="1200" dirty="0"/>
+                        <a:t>{{col:db_objects_top10.csv[15]}}</a:t>
+                      </a:r>
+                    </a:p>
+                  </a:txBody>
+                  <a:tcPr/>
+                </a:tc>
+                <a:tc>
+                  <a:txBody>
+                    <a:bodyPr/>
+                    <a:lstStyle/>
+                    <a:p>
+                      <a:r>
+                        <a:rPr lang="en-US" sz="1200" dirty="0"/>
+                        <a:t>{{col:db_objects_top10.csv[16]}}</a:t>
                       </a:r>
                     </a:p>
                   </a:txBody>
@@ -8250,6 +8397,16 @@
                   </a:txBody>
                   <a:tcPr/>
                 </a:tc>
+                <a:tc>
+                  <a:txBody>
+                    <a:bodyPr/>
+                    <a:lstStyle/>
+                    <a:p>
+                      <a:endParaRPr lang="en-US" sz="1200"/>
+                    </a:p>
+                  </a:txBody>
+                  <a:tcPr/>
+                </a:tc>
                 <a:extLst>
                   <a:ext uri="{0D108BD9-81ED-4DB2-BD59-A6C34878D82A}">
                     <a16:rowId xmlns:a16="http://schemas.microsoft.com/office/drawing/2014/main" val="4182309358"/>
@@ -8357,6 +8514,16 @@
                   </a:txBody>
                   <a:tcPr/>
                 </a:tc>
+                <a:tc>
+                  <a:txBody>
+                    <a:bodyPr/>
+                    <a:lstStyle/>
+                    <a:p>
+                      <a:endParaRPr lang="en-US" sz="1200"/>
+                    </a:p>
+                  </a:txBody>
+                  <a:tcPr/>
+                </a:tc>
                 <a:extLst>
                   <a:ext uri="{0D108BD9-81ED-4DB2-BD59-A6C34878D82A}">
                     <a16:rowId xmlns:a16="http://schemas.microsoft.com/office/drawing/2014/main" val="3498526912"/>
@@ -8464,6 +8631,16 @@
                   </a:txBody>
                   <a:tcPr/>
                 </a:tc>
+                <a:tc>
+                  <a:txBody>
+                    <a:bodyPr/>
+                    <a:lstStyle/>
+                    <a:p>
+                      <a:endParaRPr lang="en-US" sz="1200"/>
+                    </a:p>
+                  </a:txBody>
+                  <a:tcPr/>
+                </a:tc>
                 <a:extLst>
                   <a:ext uri="{0D108BD9-81ED-4DB2-BD59-A6C34878D82A}">
                     <a16:rowId xmlns:a16="http://schemas.microsoft.com/office/drawing/2014/main" val="1454101063"/>
@@ -8571,6 +8748,16 @@
                   </a:txBody>
                   <a:tcPr/>
                 </a:tc>
+                <a:tc>
+                  <a:txBody>
+                    <a:bodyPr/>
+                    <a:lstStyle/>
+                    <a:p>
+                      <a:endParaRPr lang="en-US" sz="1200"/>
+                    </a:p>
+                  </a:txBody>
+                  <a:tcPr/>
+                </a:tc>
                 <a:extLst>
                   <a:ext uri="{0D108BD9-81ED-4DB2-BD59-A6C34878D82A}">
                     <a16:rowId xmlns:a16="http://schemas.microsoft.com/office/drawing/2014/main" val="1464210951"/>
@@ -8678,6 +8865,16 @@
                   </a:txBody>
                   <a:tcPr/>
                 </a:tc>
+                <a:tc>
+                  <a:txBody>
+                    <a:bodyPr/>
+                    <a:lstStyle/>
+                    <a:p>
+                      <a:endParaRPr lang="en-US" sz="1200"/>
+                    </a:p>
+                  </a:txBody>
+                  <a:tcPr/>
+                </a:tc>
                 <a:extLst>
                   <a:ext uri="{0D108BD9-81ED-4DB2-BD59-A6C34878D82A}">
                     <a16:rowId xmlns:a16="http://schemas.microsoft.com/office/drawing/2014/main" val="4284130718"/>
@@ -8785,6 +8982,16 @@
                   </a:txBody>
                   <a:tcPr/>
                 </a:tc>
+                <a:tc>
+                  <a:txBody>
+                    <a:bodyPr/>
+                    <a:lstStyle/>
+                    <a:p>
+                      <a:endParaRPr lang="en-US" sz="1200"/>
+                    </a:p>
+                  </a:txBody>
+                  <a:tcPr/>
+                </a:tc>
                 <a:extLst>
                   <a:ext uri="{0D108BD9-81ED-4DB2-BD59-A6C34878D82A}">
                     <a16:rowId xmlns:a16="http://schemas.microsoft.com/office/drawing/2014/main" val="3581709144"/>
@@ -8892,6 +9099,16 @@
                   </a:txBody>
                   <a:tcPr/>
                 </a:tc>
+                <a:tc>
+                  <a:txBody>
+                    <a:bodyPr/>
+                    <a:lstStyle/>
+                    <a:p>
+                      <a:endParaRPr lang="en-US" sz="1200" dirty="0"/>
+                    </a:p>
+                  </a:txBody>
+                  <a:tcPr/>
+                </a:tc>
                 <a:extLst>
                   <a:ext uri="{0D108BD9-81ED-4DB2-BD59-A6C34878D82A}">
                     <a16:rowId xmlns:a16="http://schemas.microsoft.com/office/drawing/2014/main" val="1518623288"/>
@@ -8999,6 +9216,16 @@
                   </a:txBody>
                   <a:tcPr/>
                 </a:tc>
+                <a:tc>
+                  <a:txBody>
+                    <a:bodyPr/>
+                    <a:lstStyle/>
+                    <a:p>
+                      <a:endParaRPr lang="en-US" sz="1200" dirty="0"/>
+                    </a:p>
+                  </a:txBody>
+                  <a:tcPr/>
+                </a:tc>
                 <a:extLst>
                   <a:ext uri="{0D108BD9-81ED-4DB2-BD59-A6C34878D82A}">
                     <a16:rowId xmlns:a16="http://schemas.microsoft.com/office/drawing/2014/main" val="226657274"/>
@@ -9106,6 +9333,16 @@
                   </a:txBody>
                   <a:tcPr/>
                 </a:tc>
+                <a:tc>
+                  <a:txBody>
+                    <a:bodyPr/>
+                    <a:lstStyle/>
+                    <a:p>
+                      <a:endParaRPr lang="en-US" sz="1200" dirty="0"/>
+                    </a:p>
+                  </a:txBody>
+                  <a:tcPr/>
+                </a:tc>
                 <a:extLst>
                   <a:ext uri="{0D108BD9-81ED-4DB2-BD59-A6C34878D82A}">
                     <a16:rowId xmlns:a16="http://schemas.microsoft.com/office/drawing/2014/main" val="4079905487"/>
@@ -9113,6 +9350,16 @@
                 </a:extLst>
               </a:tr>
               <a:tr h="296168">
+                <a:tc>
+                  <a:txBody>
+                    <a:bodyPr/>
+                    <a:lstStyle/>
+                    <a:p>
+                      <a:endParaRPr lang="en-US" sz="1200" dirty="0"/>
+                    </a:p>
+                  </a:txBody>
+                  <a:tcPr/>
+                </a:tc>
                 <a:tc>
                   <a:txBody>
                     <a:bodyPr/>
@@ -9307,7 +9554,7 @@
 </p:sld>
 </file>
 
-<file path=ppt/slides/slide6.xml><?xml version="1.0" encoding="utf-8"?>
+<file path=ppt/slides/slide7.xml><?xml version="1.0" encoding="utf-8"?>
 <p:sld xmlns:a="http://schemas.openxmlformats.org/drawingml/2006/main" xmlns:r="http://schemas.openxmlformats.org/officeDocument/2006/relationships" xmlns:p="http://schemas.openxmlformats.org/presentationml/2006/main">
   <p:cSld>
     <p:spTree>
@@ -9396,7 +9643,7 @@
 </p:sld>
 </file>
 
-<file path=ppt/slides/slide7.xml><?xml version="1.0" encoding="utf-8"?>
+<file path=ppt/slides/slide8.xml><?xml version="1.0" encoding="utf-8"?>
 <p:sld xmlns:a="http://schemas.openxmlformats.org/drawingml/2006/main" xmlns:r="http://schemas.openxmlformats.org/officeDocument/2006/relationships" xmlns:p="http://schemas.openxmlformats.org/presentationml/2006/main">
   <p:cSld>
     <p:spTree>
@@ -9775,7 +10022,7 @@
 </p:sld>
 </file>
 
-<file path=ppt/slides/slide8.xml><?xml version="1.0" encoding="utf-8"?>
+<file path=ppt/slides/slide9.xml><?xml version="1.0" encoding="utf-8"?>
 <p:sld xmlns:a="http://schemas.openxmlformats.org/drawingml/2006/main" xmlns:r="http://schemas.openxmlformats.org/officeDocument/2006/relationships" xmlns:p="http://schemas.openxmlformats.org/presentationml/2006/main">
   <p:cSld>
     <p:spTree>
@@ -11004,9 +11251,12 @@
 </file>
 
 <file path=customXml/item1.xml><?xml version="1.0" encoding="utf-8"?>
-<p:properties xmlns:p="http://schemas.microsoft.com/office/2006/metadata/properties" xmlns:xsi="http://www.w3.org/2001/XMLSchema-instance" xmlns:pc="http://schemas.microsoft.com/office/infopath/2007/PartnerControls">
-  <documentManagement/>
-</p:properties>
+<?mso-contentType ?>
+<FormTemplates xmlns="http://schemas.microsoft.com/sharepoint/v3/contenttype/forms">
+  <Display>DocumentLibraryForm</Display>
+  <Edit>DocumentLibraryForm</Edit>
+  <New>DocumentLibraryForm</New>
+</FormTemplates>
 </file>
 
 <file path=customXml/item2.xml><?xml version="1.0" encoding="utf-8"?>
@@ -11124,27 +11374,15 @@
 </file>
 
 <file path=customXml/item3.xml><?xml version="1.0" encoding="utf-8"?>
-<?mso-contentType ?>
-<FormTemplates xmlns="http://schemas.microsoft.com/sharepoint/v3/contenttype/forms">
-  <Display>DocumentLibraryForm</Display>
-  <Edit>DocumentLibraryForm</Edit>
-  <New>DocumentLibraryForm</New>
-</FormTemplates>
+<p:properties xmlns:p="http://schemas.microsoft.com/office/2006/metadata/properties" xmlns:xsi="http://www.w3.org/2001/XMLSchema-instance" xmlns:pc="http://schemas.microsoft.com/office/infopath/2007/PartnerControls">
+  <documentManagement/>
+</p:properties>
 </file>
 
 <file path=customXml/itemProps1.xml><?xml version="1.0" encoding="utf-8"?>
-<ds:datastoreItem xmlns:ds="http://schemas.openxmlformats.org/officeDocument/2006/customXml" ds:itemID="{19C64E80-8200-4669-BC3C-EA57A9064010}">
+<ds:datastoreItem xmlns:ds="http://schemas.openxmlformats.org/officeDocument/2006/customXml" ds:itemID="{D03F60F6-267C-4F0B-90AC-53495EF22DB8}">
   <ds:schemaRefs>
-    <ds:schemaRef ds:uri="http://schemas.microsoft.com/office/infopath/2007/PartnerControls"/>
-    <ds:schemaRef ds:uri="http://schemas.openxmlformats.org/package/2006/metadata/core-properties"/>
-    <ds:schemaRef ds:uri="56123433-40cc-482a-838d-44eebed83084"/>
-    <ds:schemaRef ds:uri="http://purl.org/dc/elements/1.1/"/>
-    <ds:schemaRef ds:uri="http://purl.org/dc/dcmitype/"/>
-    <ds:schemaRef ds:uri="7d2247ee-dcae-49b5-8e6a-08fc19cc9b93"/>
-    <ds:schemaRef ds:uri="http://schemas.microsoft.com/office/2006/documentManagement/types"/>
-    <ds:schemaRef ds:uri="http://schemas.microsoft.com/office/2006/metadata/properties"/>
-    <ds:schemaRef ds:uri="http://www.w3.org/XML/1998/namespace"/>
-    <ds:schemaRef ds:uri="http://purl.org/dc/terms/"/>
+    <ds:schemaRef ds:uri="http://schemas.microsoft.com/sharepoint/v3/contenttype/forms"/>
   </ds:schemaRefs>
 </ds:datastoreItem>
 </file>
@@ -11166,9 +11404,18 @@
 </file>
 
 <file path=customXml/itemProps3.xml><?xml version="1.0" encoding="utf-8"?>
-<ds:datastoreItem xmlns:ds="http://schemas.openxmlformats.org/officeDocument/2006/customXml" ds:itemID="{D03F60F6-267C-4F0B-90AC-53495EF22DB8}">
+<ds:datastoreItem xmlns:ds="http://schemas.openxmlformats.org/officeDocument/2006/customXml" ds:itemID="{19C64E80-8200-4669-BC3C-EA57A9064010}">
   <ds:schemaRefs>
-    <ds:schemaRef ds:uri="http://schemas.microsoft.com/sharepoint/v3/contenttype/forms"/>
+    <ds:schemaRef ds:uri="http://schemas.microsoft.com/office/infopath/2007/PartnerControls"/>
+    <ds:schemaRef ds:uri="http://schemas.openxmlformats.org/package/2006/metadata/core-properties"/>
+    <ds:schemaRef ds:uri="56123433-40cc-482a-838d-44eebed83084"/>
+    <ds:schemaRef ds:uri="http://purl.org/dc/elements/1.1/"/>
+    <ds:schemaRef ds:uri="http://purl.org/dc/dcmitype/"/>
+    <ds:schemaRef ds:uri="7d2247ee-dcae-49b5-8e6a-08fc19cc9b93"/>
+    <ds:schemaRef ds:uri="http://schemas.microsoft.com/office/2006/documentManagement/types"/>
+    <ds:schemaRef ds:uri="http://schemas.microsoft.com/office/2006/metadata/properties"/>
+    <ds:schemaRef ds:uri="http://www.w3.org/XML/1998/namespace"/>
+    <ds:schemaRef ds:uri="http://purl.org/dc/terms/"/>
   </ds:schemaRefs>
 </ds:datastoreItem>
 </file>
</xml_diff>

<commit_message>
updated to remove status template (bug)
</commit_message>
<xml_diff>
--- a/filesets/success_plan/success_plan.pptx
+++ b/filesets/success_plan/success_plan.pptx
@@ -11,7 +11,7 @@
     <p:handoutMasterId r:id="rId15"/>
   </p:handoutMasterIdLst>
   <p:sldIdLst>
-    <p:sldId id="2139118629" r:id="rId5"/>
+    <p:sldId id="2139119246" r:id="rId5"/>
     <p:sldId id="288" r:id="rId6"/>
     <p:sldId id="2139119242" r:id="rId7"/>
     <p:sldId id="2139119243" r:id="rId8"/>
@@ -4921,10 +4921,10 @@
       </p:grpSpPr>
       <p:sp>
         <p:nvSpPr>
-          <p:cNvPr id="3" name="Title 2">
+          <p:cNvPr id="3" name="Text Placeholder 2">
             <a:extLst>
               <a:ext uri="{FF2B5EF4-FFF2-40B4-BE49-F238E27FC236}">
-                <a16:creationId xmlns:a16="http://schemas.microsoft.com/office/drawing/2014/main" id="{C8AAC075-E97C-C042-9780-EC090B8EBFE3}"/>
+                <a16:creationId xmlns:a16="http://schemas.microsoft.com/office/drawing/2014/main" id="{0ED6EB3C-AECB-7746-8826-E65464B462A5}"/>
               </a:ext>
             </a:extLst>
           </p:cNvPr>
@@ -4932,93 +4932,56 @@
             <a:spLocks noGrp="1"/>
           </p:cNvSpPr>
           <p:nvPr>
-            <p:ph type="title"/>
+            <p:ph type="body" sz="quarter" idx="10"/>
           </p:nvPr>
         </p:nvSpPr>
-        <p:spPr>
-          <a:xfrm>
-            <a:off x="100594" y="184056"/>
-            <a:ext cx="10515600" cy="507033"/>
-          </a:xfrm>
-        </p:spPr>
+        <p:spPr/>
         <p:txBody>
           <a:bodyPr/>
           <a:lstStyle/>
           <a:p>
             <a:r>
               <a:rPr lang="en-US" dirty="0"/>
-              <a:t>Status Updates</a:t>
+              <a:t>Business Usage Analysis</a:t>
             </a:r>
           </a:p>
         </p:txBody>
       </p:sp>
-      <p:graphicFrame>
-        <p:nvGraphicFramePr>
-          <p:cNvPr id="4" name="Object 3">
+      <p:sp>
+        <p:nvSpPr>
+          <p:cNvPr id="5" name="Subtitle 4">
             <a:extLst>
               <a:ext uri="{FF2B5EF4-FFF2-40B4-BE49-F238E27FC236}">
-                <a16:creationId xmlns:a16="http://schemas.microsoft.com/office/drawing/2014/main" id="{5EA68C9E-C94E-5546-B903-9E009C28B73D}"/>
+                <a16:creationId xmlns:a16="http://schemas.microsoft.com/office/drawing/2014/main" id="{3FF9C6B6-D6C7-AC49-920C-A49646ED099D}"/>
               </a:ext>
             </a:extLst>
           </p:cNvPr>
-          <p:cNvGraphicFramePr>
-            <a:graphicFrameLocks noChangeAspect="1"/>
-          </p:cNvGraphicFramePr>
-          <p:nvPr/>
-        </p:nvGraphicFramePr>
-        <p:xfrm>
-          <a:off x="463654" y="866898"/>
-          <a:ext cx="11264691" cy="5553529"/>
-        </p:xfrm>
-        <a:graphic>
-          <a:graphicData uri="http://schemas.openxmlformats.org/presentationml/2006/ole">
-            <mc:AlternateContent xmlns:mc="http://schemas.openxmlformats.org/markup-compatibility/2006">
-              <mc:Choice xmlns:v="urn:schemas-microsoft-com:vml" Requires="v">
-                <p:oleObj spid="_x0000_s1027" name="Worksheet" r:id="rId3" imgW="11798300" imgH="5816600" progId="Excel.Sheet.12">
-                  <p:embed/>
-                </p:oleObj>
-              </mc:Choice>
-              <mc:Fallback>
-                <p:oleObj name="Worksheet" r:id="rId3" imgW="11798300" imgH="5816600" progId="Excel.Sheet.12">
-                  <p:embed/>
-                  <p:pic>
-                    <p:nvPicPr>
-                      <p:cNvPr id="4" name="Object 3">
-                        <a:extLst>
-                          <a:ext uri="{FF2B5EF4-FFF2-40B4-BE49-F238E27FC236}">
-                            <a16:creationId xmlns:a16="http://schemas.microsoft.com/office/drawing/2014/main" id="{5EA68C9E-C94E-5546-B903-9E009C28B73D}"/>
-                          </a:ext>
-                        </a:extLst>
-                      </p:cNvPr>
-                      <p:cNvPicPr/>
-                      <p:nvPr/>
-                    </p:nvPicPr>
-                    <p:blipFill>
-                      <a:blip r:embed="rId4"/>
-                      <a:stretch>
-                        <a:fillRect/>
-                      </a:stretch>
-                    </p:blipFill>
-                    <p:spPr>
-                      <a:xfrm>
-                        <a:off x="463654" y="866898"/>
-                        <a:ext cx="11264691" cy="5553529"/>
-                      </a:xfrm>
-                      <a:prstGeom prst="rect">
-                        <a:avLst/>
-                      </a:prstGeom>
-                    </p:spPr>
-                  </p:pic>
-                </p:oleObj>
-              </mc:Fallback>
-            </mc:AlternateContent>
-          </a:graphicData>
-        </a:graphic>
-      </p:graphicFrame>
+          <p:cNvSpPr>
+            <a:spLocks noGrp="1"/>
+          </p:cNvSpPr>
+          <p:nvPr>
+            <p:ph type="subTitle" idx="1"/>
+          </p:nvPr>
+        </p:nvSpPr>
+        <p:spPr/>
+        <p:txBody>
+          <a:bodyPr/>
+          <a:lstStyle/>
+          <a:p>
+            <a:r>
+              <a:rPr lang="en-US" b="1" dirty="0"/>
+              <a:t>Consumption Analytics</a:t>
+            </a:r>
+          </a:p>
+          <a:p>
+            <a:endParaRPr lang="en-US" dirty="0"/>
+          </a:p>
+        </p:txBody>
+      </p:sp>
     </p:spTree>
     <p:extLst>
       <p:ext uri="{BB962C8B-B14F-4D97-AF65-F5344CB8AC3E}">
-        <p14:creationId xmlns:p14="http://schemas.microsoft.com/office/powerpoint/2010/main" val="2482411873"/>
+        <p14:creationId xmlns:p14="http://schemas.microsoft.com/office/powerpoint/2010/main" val="2139423677"/>
       </p:ext>
     </p:extLst>
   </p:cSld>
@@ -11251,12 +11214,9 @@
 </file>
 
 <file path=customXml/item1.xml><?xml version="1.0" encoding="utf-8"?>
-<?mso-contentType ?>
-<FormTemplates xmlns="http://schemas.microsoft.com/sharepoint/v3/contenttype/forms">
-  <Display>DocumentLibraryForm</Display>
-  <Edit>DocumentLibraryForm</Edit>
-  <New>DocumentLibraryForm</New>
-</FormTemplates>
+<p:properties xmlns:p="http://schemas.microsoft.com/office/2006/metadata/properties" xmlns:xsi="http://www.w3.org/2001/XMLSchema-instance" xmlns:pc="http://schemas.microsoft.com/office/infopath/2007/PartnerControls">
+  <documentManagement/>
+</p:properties>
 </file>
 
 <file path=customXml/item2.xml><?xml version="1.0" encoding="utf-8"?>
@@ -11374,15 +11334,27 @@
 </file>
 
 <file path=customXml/item3.xml><?xml version="1.0" encoding="utf-8"?>
-<p:properties xmlns:p="http://schemas.microsoft.com/office/2006/metadata/properties" xmlns:xsi="http://www.w3.org/2001/XMLSchema-instance" xmlns:pc="http://schemas.microsoft.com/office/infopath/2007/PartnerControls">
-  <documentManagement/>
-</p:properties>
+<?mso-contentType ?>
+<FormTemplates xmlns="http://schemas.microsoft.com/sharepoint/v3/contenttype/forms">
+  <Display>DocumentLibraryForm</Display>
+  <Edit>DocumentLibraryForm</Edit>
+  <New>DocumentLibraryForm</New>
+</FormTemplates>
 </file>
 
 <file path=customXml/itemProps1.xml><?xml version="1.0" encoding="utf-8"?>
-<ds:datastoreItem xmlns:ds="http://schemas.openxmlformats.org/officeDocument/2006/customXml" ds:itemID="{D03F60F6-267C-4F0B-90AC-53495EF22DB8}">
+<ds:datastoreItem xmlns:ds="http://schemas.openxmlformats.org/officeDocument/2006/customXml" ds:itemID="{19C64E80-8200-4669-BC3C-EA57A9064010}">
   <ds:schemaRefs>
-    <ds:schemaRef ds:uri="http://schemas.microsoft.com/sharepoint/v3/contenttype/forms"/>
+    <ds:schemaRef ds:uri="http://schemas.microsoft.com/office/infopath/2007/PartnerControls"/>
+    <ds:schemaRef ds:uri="http://schemas.openxmlformats.org/package/2006/metadata/core-properties"/>
+    <ds:schemaRef ds:uri="56123433-40cc-482a-838d-44eebed83084"/>
+    <ds:schemaRef ds:uri="http://purl.org/dc/elements/1.1/"/>
+    <ds:schemaRef ds:uri="http://purl.org/dc/dcmitype/"/>
+    <ds:schemaRef ds:uri="7d2247ee-dcae-49b5-8e6a-08fc19cc9b93"/>
+    <ds:schemaRef ds:uri="http://schemas.microsoft.com/office/2006/documentManagement/types"/>
+    <ds:schemaRef ds:uri="http://schemas.microsoft.com/office/2006/metadata/properties"/>
+    <ds:schemaRef ds:uri="http://www.w3.org/XML/1998/namespace"/>
+    <ds:schemaRef ds:uri="http://purl.org/dc/terms/"/>
   </ds:schemaRefs>
 </ds:datastoreItem>
 </file>
@@ -11404,18 +11376,9 @@
 </file>
 
 <file path=customXml/itemProps3.xml><?xml version="1.0" encoding="utf-8"?>
-<ds:datastoreItem xmlns:ds="http://schemas.openxmlformats.org/officeDocument/2006/customXml" ds:itemID="{19C64E80-8200-4669-BC3C-EA57A9064010}">
+<ds:datastoreItem xmlns:ds="http://schemas.openxmlformats.org/officeDocument/2006/customXml" ds:itemID="{D03F60F6-267C-4F0B-90AC-53495EF22DB8}">
   <ds:schemaRefs>
-    <ds:schemaRef ds:uri="http://schemas.microsoft.com/office/infopath/2007/PartnerControls"/>
-    <ds:schemaRef ds:uri="http://schemas.openxmlformats.org/package/2006/metadata/core-properties"/>
-    <ds:schemaRef ds:uri="56123433-40cc-482a-838d-44eebed83084"/>
-    <ds:schemaRef ds:uri="http://purl.org/dc/elements/1.1/"/>
-    <ds:schemaRef ds:uri="http://purl.org/dc/dcmitype/"/>
-    <ds:schemaRef ds:uri="7d2247ee-dcae-49b5-8e6a-08fc19cc9b93"/>
-    <ds:schemaRef ds:uri="http://schemas.microsoft.com/office/2006/documentManagement/types"/>
-    <ds:schemaRef ds:uri="http://schemas.microsoft.com/office/2006/metadata/properties"/>
-    <ds:schemaRef ds:uri="http://www.w3.org/XML/1998/namespace"/>
-    <ds:schemaRef ds:uri="http://purl.org/dc/terms/"/>
+    <ds:schemaRef ds:uri="http://schemas.microsoft.com/sharepoint/v3/contenttype/forms"/>
   </ds:schemaRefs>
 </ds:datastoreItem>
 </file>
</xml_diff>

<commit_message>
update format for success plans
</commit_message>
<xml_diff>
--- a/filesets/success_plan/success_plan.pptx
+++ b/filesets/success_plan/success_plan.pptx
@@ -744,34 +744,6 @@
           <a:bodyPr/>
           <a:lstStyle/>
           <a:p>
-            <a:r>
-              <a:rPr lang="en-US" sz="1200" b="0" i="0" kern="1200" dirty="0">
-                <a:solidFill>
-                  <a:schemeClr val="tx1"/>
-                </a:solidFill>
-                <a:effectLst/>
-                <a:latin typeface="Arial Regular"/>
-                <a:ea typeface="+mn-ea"/>
-                <a:cs typeface="+mn-cs"/>
-              </a:rPr>
-              <a:t>For systems which TCA has detected PDCR or otherwise been configured to use PDCR, collection will occur daily at midnight and noon.</a:t>
-            </a:r>
-          </a:p>
-          <a:p>
-            <a:r>
-              <a:rPr lang="en-US" sz="1200" b="0" i="0" kern="1200" dirty="0">
-                <a:solidFill>
-                  <a:schemeClr val="tx1"/>
-                </a:solidFill>
-                <a:effectLst/>
-                <a:latin typeface="Arial Regular"/>
-                <a:ea typeface="+mn-ea"/>
-                <a:cs typeface="+mn-cs"/>
-              </a:rPr>
-              <a:t>For systems which TCA is using DBC sources, collection will occur daily at midnight, 6am, noon, and 6pm.</a:t>
-            </a:r>
-          </a:p>
-          <a:p>
             <a:endParaRPr lang="en-US" dirty="0"/>
           </a:p>
         </p:txBody>
@@ -794,6 +766,119 @@
             <a:fld id="{FFDCFA53-E6C0-FD4E-82A8-4284543D7962}" type="slidenum">
               <a:rPr lang="en-US" smtClean="0"/>
               <a:pPr/>
+              <a:t>2</a:t>
+            </a:fld>
+            <a:endParaRPr lang="en-US" dirty="0"/>
+          </a:p>
+        </p:txBody>
+      </p:sp>
+    </p:spTree>
+    <p:extLst>
+      <p:ext uri="{BB962C8B-B14F-4D97-AF65-F5344CB8AC3E}">
+        <p14:creationId xmlns:p14="http://schemas.microsoft.com/office/powerpoint/2010/main" val="2582211465"/>
+      </p:ext>
+    </p:extLst>
+  </p:cSld>
+  <p:clrMapOvr>
+    <a:masterClrMapping/>
+  </p:clrMapOvr>
+</p:notes>
+</file>
+
+<file path=ppt/notesSlides/notesSlide2.xml><?xml version="1.0" encoding="utf-8"?>
+<p:notes xmlns:a="http://schemas.openxmlformats.org/drawingml/2006/main" xmlns:r="http://schemas.openxmlformats.org/officeDocument/2006/relationships" xmlns:p="http://schemas.openxmlformats.org/presentationml/2006/main">
+  <p:cSld>
+    <p:spTree>
+      <p:nvGrpSpPr>
+        <p:cNvPr id="1" name=""/>
+        <p:cNvGrpSpPr/>
+        <p:nvPr/>
+      </p:nvGrpSpPr>
+      <p:grpSpPr>
+        <a:xfrm>
+          <a:off x="0" y="0"/>
+          <a:ext cx="0" cy="0"/>
+          <a:chOff x="0" y="0"/>
+          <a:chExt cx="0" cy="0"/>
+        </a:xfrm>
+      </p:grpSpPr>
+      <p:sp>
+        <p:nvSpPr>
+          <p:cNvPr id="2" name="Slide Image Placeholder 1"/>
+          <p:cNvSpPr>
+            <a:spLocks noGrp="1" noRot="1" noChangeAspect="1"/>
+          </p:cNvSpPr>
+          <p:nvPr>
+            <p:ph type="sldImg"/>
+          </p:nvPr>
+        </p:nvSpPr>
+        <p:spPr/>
+      </p:sp>
+      <p:sp>
+        <p:nvSpPr>
+          <p:cNvPr id="3" name="Notes Placeholder 2"/>
+          <p:cNvSpPr>
+            <a:spLocks noGrp="1"/>
+          </p:cNvSpPr>
+          <p:nvPr>
+            <p:ph type="body" idx="1"/>
+          </p:nvPr>
+        </p:nvSpPr>
+        <p:spPr/>
+        <p:txBody>
+          <a:bodyPr/>
+          <a:lstStyle/>
+          <a:p>
+            <a:r>
+              <a:rPr lang="en-US" sz="1200" b="0" i="0" kern="1200" dirty="0">
+                <a:solidFill>
+                  <a:schemeClr val="tx1"/>
+                </a:solidFill>
+                <a:effectLst/>
+                <a:latin typeface="Arial Regular"/>
+                <a:ea typeface="+mn-ea"/>
+                <a:cs typeface="+mn-cs"/>
+              </a:rPr>
+              <a:t>For systems which TCA has detected PDCR or otherwise been configured to use PDCR, collection will occur daily at midnight and noon.</a:t>
+            </a:r>
+          </a:p>
+          <a:p>
+            <a:r>
+              <a:rPr lang="en-US" sz="1200" b="0" i="0" kern="1200" dirty="0">
+                <a:solidFill>
+                  <a:schemeClr val="tx1"/>
+                </a:solidFill>
+                <a:effectLst/>
+                <a:latin typeface="Arial Regular"/>
+                <a:ea typeface="+mn-ea"/>
+                <a:cs typeface="+mn-cs"/>
+              </a:rPr>
+              <a:t>For systems which TCA is using DBC sources, collection will occur daily at midnight, 6am, noon, and 6pm.</a:t>
+            </a:r>
+          </a:p>
+          <a:p>
+            <a:endParaRPr lang="en-US" dirty="0"/>
+          </a:p>
+        </p:txBody>
+      </p:sp>
+      <p:sp>
+        <p:nvSpPr>
+          <p:cNvPr id="4" name="Slide Number Placeholder 3"/>
+          <p:cNvSpPr>
+            <a:spLocks noGrp="1"/>
+          </p:cNvSpPr>
+          <p:nvPr>
+            <p:ph type="sldNum" sz="quarter" idx="5"/>
+          </p:nvPr>
+        </p:nvSpPr>
+        <p:spPr/>
+        <p:txBody>
+          <a:bodyPr/>
+          <a:lstStyle/>
+          <a:p>
+            <a:fld id="{FFDCFA53-E6C0-FD4E-82A8-4284543D7962}" type="slidenum">
+              <a:rPr lang="en-US" smtClean="0"/>
+              <a:pPr/>
               <a:t>8</a:t>
             </a:fld>
             <a:endParaRPr lang="en-US"/>
@@ -813,7 +898,7 @@
 </p:notes>
 </file>
 
-<file path=ppt/notesSlides/notesSlide2.xml><?xml version="1.0" encoding="utf-8"?>
+<file path=ppt/notesSlides/notesSlide3.xml><?xml version="1.0" encoding="utf-8"?>
 <p:notes xmlns:a="http://schemas.openxmlformats.org/drawingml/2006/main" xmlns:r="http://schemas.openxmlformats.org/officeDocument/2006/relationships" xmlns:p="http://schemas.openxmlformats.org/presentationml/2006/main">
   <p:cSld>
     <p:spTree>
@@ -5165,7 +5250,7 @@
           <p:nvPr>
             <p:extLst>
               <p:ext uri="{D42A27DB-BD31-4B8C-83A1-F6EECF244321}">
-                <p14:modId xmlns:p14="http://schemas.microsoft.com/office/powerpoint/2010/main" val="1765243983"/>
+                <p14:modId xmlns:p14="http://schemas.microsoft.com/office/powerpoint/2010/main" val="1806148548"/>
               </p:ext>
             </p:extLst>
           </p:nvPr>
@@ -5773,7 +5858,7 @@
                       <a:pPr algn="l"/>
                       <a:r>
                         <a:rPr lang="en-US" sz="1200" dirty="0"/>
-                        <a:t> Average CPU Consumption, Peak Hours</a:t>
+                        <a:t> Average CPU Consumption%, Peak Hours</a:t>
                       </a:r>
                     </a:p>
                   </a:txBody>
@@ -5878,7 +5963,15 @@
                       <a:pPr algn="l"/>
                       <a:r>
                         <a:rPr lang="en-US" sz="1200" dirty="0"/>
-                        <a:t>Average IO Consumption, Peak Hours</a:t>
+                        <a:t>Average </a:t>
+                      </a:r>
+                      <a:r>
+                        <a:rPr lang="en-US" sz="1200"/>
+                        <a:t>IO Consumption%, </a:t>
+                      </a:r>
+                      <a:r>
+                        <a:rPr lang="en-US" sz="1200" dirty="0"/>
+                        <a:t>Peak Hours</a:t>
                       </a:r>
                     </a:p>
                   </a:txBody>
@@ -6305,7 +6398,7 @@
                       </a:r>
                       <a:r>
                         <a:rPr lang="en-US" sz="1200" dirty="0"/>
-                        <a:t>[2:4]}}</a:t>
+                        <a:t>[2:7]}}</a:t>
                       </a:r>
                     </a:p>
                   </a:txBody>
@@ -6418,7 +6511,7 @@
                       </a:r>
                       <a:r>
                         <a:rPr lang="en-US" sz="1200" dirty="0"/>
-                        <a:t>[2:5]}}</a:t>
+                        <a:t>[2:8]}}</a:t>
                       </a:r>
                     </a:p>
                   </a:txBody>
@@ -6530,9 +6623,10 @@
                         <a:t>val:db_objects_total.csv</a:t>
                       </a:r>
                       <a:r>
-                        <a:rPr lang="en-US" sz="1200" dirty="0"/>
-                        <a:t>[2:6]}}</a:t>
+                        <a:rPr lang="en-US" sz="1200"/>
+                        <a:t>[2:9]}}</a:t>
                       </a:r>
+                      <a:endParaRPr lang="en-US" sz="1200" dirty="0"/>
                     </a:p>
                   </a:txBody>
                   <a:tcPr anchor="ctr">
@@ -11214,9 +11308,12 @@
 </file>
 
 <file path=customXml/item1.xml><?xml version="1.0" encoding="utf-8"?>
-<p:properties xmlns:p="http://schemas.microsoft.com/office/2006/metadata/properties" xmlns:xsi="http://www.w3.org/2001/XMLSchema-instance" xmlns:pc="http://schemas.microsoft.com/office/infopath/2007/PartnerControls">
-  <documentManagement/>
-</p:properties>
+<?mso-contentType ?>
+<FormTemplates xmlns="http://schemas.microsoft.com/sharepoint/v3/contenttype/forms">
+  <Display>DocumentLibraryForm</Display>
+  <Edit>DocumentLibraryForm</Edit>
+  <New>DocumentLibraryForm</New>
+</FormTemplates>
 </file>
 
 <file path=customXml/item2.xml><?xml version="1.0" encoding="utf-8"?>
@@ -11334,27 +11431,15 @@
 </file>
 
 <file path=customXml/item3.xml><?xml version="1.0" encoding="utf-8"?>
-<?mso-contentType ?>
-<FormTemplates xmlns="http://schemas.microsoft.com/sharepoint/v3/contenttype/forms">
-  <Display>DocumentLibraryForm</Display>
-  <Edit>DocumentLibraryForm</Edit>
-  <New>DocumentLibraryForm</New>
-</FormTemplates>
+<p:properties xmlns:p="http://schemas.microsoft.com/office/2006/metadata/properties" xmlns:xsi="http://www.w3.org/2001/XMLSchema-instance" xmlns:pc="http://schemas.microsoft.com/office/infopath/2007/PartnerControls">
+  <documentManagement/>
+</p:properties>
 </file>
 
 <file path=customXml/itemProps1.xml><?xml version="1.0" encoding="utf-8"?>
-<ds:datastoreItem xmlns:ds="http://schemas.openxmlformats.org/officeDocument/2006/customXml" ds:itemID="{19C64E80-8200-4669-BC3C-EA57A9064010}">
+<ds:datastoreItem xmlns:ds="http://schemas.openxmlformats.org/officeDocument/2006/customXml" ds:itemID="{D03F60F6-267C-4F0B-90AC-53495EF22DB8}">
   <ds:schemaRefs>
-    <ds:schemaRef ds:uri="http://schemas.microsoft.com/office/infopath/2007/PartnerControls"/>
-    <ds:schemaRef ds:uri="http://schemas.openxmlformats.org/package/2006/metadata/core-properties"/>
-    <ds:schemaRef ds:uri="56123433-40cc-482a-838d-44eebed83084"/>
-    <ds:schemaRef ds:uri="http://purl.org/dc/elements/1.1/"/>
-    <ds:schemaRef ds:uri="http://purl.org/dc/dcmitype/"/>
-    <ds:schemaRef ds:uri="7d2247ee-dcae-49b5-8e6a-08fc19cc9b93"/>
-    <ds:schemaRef ds:uri="http://schemas.microsoft.com/office/2006/documentManagement/types"/>
-    <ds:schemaRef ds:uri="http://schemas.microsoft.com/office/2006/metadata/properties"/>
-    <ds:schemaRef ds:uri="http://www.w3.org/XML/1998/namespace"/>
-    <ds:schemaRef ds:uri="http://purl.org/dc/terms/"/>
+    <ds:schemaRef ds:uri="http://schemas.microsoft.com/sharepoint/v3/contenttype/forms"/>
   </ds:schemaRefs>
 </ds:datastoreItem>
 </file>
@@ -11376,9 +11461,18 @@
 </file>
 
 <file path=customXml/itemProps3.xml><?xml version="1.0" encoding="utf-8"?>
-<ds:datastoreItem xmlns:ds="http://schemas.openxmlformats.org/officeDocument/2006/customXml" ds:itemID="{D03F60F6-267C-4F0B-90AC-53495EF22DB8}">
+<ds:datastoreItem xmlns:ds="http://schemas.openxmlformats.org/officeDocument/2006/customXml" ds:itemID="{19C64E80-8200-4669-BC3C-EA57A9064010}">
   <ds:schemaRefs>
-    <ds:schemaRef ds:uri="http://schemas.microsoft.com/sharepoint/v3/contenttype/forms"/>
+    <ds:schemaRef ds:uri="http://schemas.microsoft.com/office/infopath/2007/PartnerControls"/>
+    <ds:schemaRef ds:uri="http://schemas.openxmlformats.org/package/2006/metadata/core-properties"/>
+    <ds:schemaRef ds:uri="56123433-40cc-482a-838d-44eebed83084"/>
+    <ds:schemaRef ds:uri="http://purl.org/dc/elements/1.1/"/>
+    <ds:schemaRef ds:uri="http://purl.org/dc/dcmitype/"/>
+    <ds:schemaRef ds:uri="7d2247ee-dcae-49b5-8e6a-08fc19cc9b93"/>
+    <ds:schemaRef ds:uri="http://schemas.microsoft.com/office/2006/documentManagement/types"/>
+    <ds:schemaRef ds:uri="http://schemas.microsoft.com/office/2006/metadata/properties"/>
+    <ds:schemaRef ds:uri="http://www.w3.org/XML/1998/namespace"/>
+    <ds:schemaRef ds:uri="http://purl.org/dc/terms/"/>
   </ds:schemaRefs>
 </ds:datastoreItem>
 </file>
</xml_diff>

<commit_message>
adjusted pptx table to correct number of rows to work-around bug
</commit_message>
<xml_diff>
--- a/filesets/success_plan/success_plan.pptx
+++ b/filesets/success_plan/success_plan.pptx
@@ -238,7 +238,7 @@
               <a:rPr lang="en-US" smtClean="0">
                 <a:latin typeface="Arial Regular"/>
               </a:rPr>
-              <a:t>6/29/20</a:t>
+              <a:t>7/22/20</a:t>
             </a:fld>
             <a:endParaRPr lang="en-US" dirty="0">
               <a:latin typeface="Arial Regular"/>
@@ -428,7 +428,7 @@
             <a:fld id="{C7103FDF-5845-2441-8890-D723FF5A85D0}" type="datetimeFigureOut">
               <a:rPr lang="en-US" smtClean="0"/>
               <a:pPr/>
-              <a:t>6/29/20</a:t>
+              <a:t>7/22/20</a:t>
             </a:fld>
             <a:endParaRPr lang="en-US" dirty="0"/>
           </a:p>
@@ -6961,14 +6961,14 @@
           <p:nvPr>
             <p:extLst>
               <p:ext uri="{D42A27DB-BD31-4B8C-83A1-F6EECF244321}">
-                <p14:modId xmlns:p14="http://schemas.microsoft.com/office/powerpoint/2010/main" val="803381384"/>
+                <p14:modId xmlns:p14="http://schemas.microsoft.com/office/powerpoint/2010/main" val="2901170101"/>
               </p:ext>
             </p:extLst>
           </p:nvPr>
         </p:nvGraphicFramePr>
         <p:xfrm>
           <a:off x="587482" y="1407861"/>
-          <a:ext cx="6375178" cy="4794641"/>
+          <a:ext cx="6375178" cy="3553676"/>
         </p:xfrm>
         <a:graphic>
           <a:graphicData uri="http://schemas.openxmlformats.org/drawingml/2006/table">
@@ -7211,87 +7211,6 @@
                 <a:extLst>
                   <a:ext uri="{0D108BD9-81ED-4DB2-BD59-A6C34878D82A}">
                     <a16:rowId xmlns:a16="http://schemas.microsoft.com/office/drawing/2014/main" val="4205844891"/>
-                  </a:ext>
-                </a:extLst>
-              </a:tr>
-              <a:tr h="413655">
-                <a:tc>
-                  <a:txBody>
-                    <a:bodyPr/>
-                    <a:lstStyle/>
-                    <a:p>
-                      <a:endParaRPr lang="en-US" sz="1600" dirty="0"/>
-                    </a:p>
-                  </a:txBody>
-                  <a:tcPr/>
-                </a:tc>
-                <a:tc>
-                  <a:txBody>
-                    <a:bodyPr/>
-                    <a:lstStyle/>
-                    <a:p>
-                      <a:endParaRPr lang="en-US" sz="1600" dirty="0"/>
-                    </a:p>
-                  </a:txBody>
-                  <a:tcPr/>
-                </a:tc>
-                <a:extLst>
-                  <a:ext uri="{0D108BD9-81ED-4DB2-BD59-A6C34878D82A}">
-                    <a16:rowId xmlns:a16="http://schemas.microsoft.com/office/drawing/2014/main" val="3113689797"/>
-                  </a:ext>
-                </a:extLst>
-              </a:tr>
-              <a:tr h="413655">
-                <a:tc>
-                  <a:txBody>
-                    <a:bodyPr/>
-                    <a:lstStyle/>
-                    <a:p>
-                      <a:endParaRPr lang="en-US" sz="1600" dirty="0"/>
-                    </a:p>
-                  </a:txBody>
-                  <a:tcPr/>
-                </a:tc>
-                <a:tc>
-                  <a:txBody>
-                    <a:bodyPr/>
-                    <a:lstStyle/>
-                    <a:p>
-                      <a:endParaRPr lang="en-US" sz="1600" dirty="0"/>
-                    </a:p>
-                  </a:txBody>
-                  <a:tcPr/>
-                </a:tc>
-                <a:extLst>
-                  <a:ext uri="{0D108BD9-81ED-4DB2-BD59-A6C34878D82A}">
-                    <a16:rowId xmlns:a16="http://schemas.microsoft.com/office/drawing/2014/main" val="505788612"/>
-                  </a:ext>
-                </a:extLst>
-              </a:tr>
-              <a:tr h="413655">
-                <a:tc>
-                  <a:txBody>
-                    <a:bodyPr/>
-                    <a:lstStyle/>
-                    <a:p>
-                      <a:endParaRPr lang="en-US" sz="1600" dirty="0"/>
-                    </a:p>
-                  </a:txBody>
-                  <a:tcPr/>
-                </a:tc>
-                <a:tc>
-                  <a:txBody>
-                    <a:bodyPr/>
-                    <a:lstStyle/>
-                    <a:p>
-                      <a:endParaRPr lang="en-US" sz="1600" dirty="0"/>
-                    </a:p>
-                  </a:txBody>
-                  <a:tcPr/>
-                </a:tc>
-                <a:extLst>
-                  <a:ext uri="{0D108BD9-81ED-4DB2-BD59-A6C34878D82A}">
-                    <a16:rowId xmlns:a16="http://schemas.microsoft.com/office/drawing/2014/main" val="414306743"/>
                   </a:ext>
                 </a:extLst>
               </a:tr>
@@ -11317,6 +11236,12 @@
 </file>
 
 <file path=customXml/item2.xml><?xml version="1.0" encoding="utf-8"?>
+<p:properties xmlns:p="http://schemas.microsoft.com/office/2006/metadata/properties" xmlns:xsi="http://www.w3.org/2001/XMLSchema-instance" xmlns:pc="http://schemas.microsoft.com/office/infopath/2007/PartnerControls">
+  <documentManagement/>
+</p:properties>
+</file>
+
+<file path=customXml/item3.xml><?xml version="1.0" encoding="utf-8"?>
 <ct:contentTypeSchema xmlns:ct="http://schemas.microsoft.com/office/2006/metadata/contentType" xmlns:ma="http://schemas.microsoft.com/office/2006/metadata/properties/metaAttributes" ct:_="" ma:_="" ma:contentTypeName="Document" ma:contentTypeID="0x010100B142CB505444CE45B67D97A18A4C306A" ma:contentTypeVersion="0" ma:contentTypeDescription="Create a new document." ma:contentTypeScope="" ma:versionID="50e079853f9ec040d2a30adbbde6ee65">
   <xsd:schema xmlns:xsd="http://www.w3.org/2001/XMLSchema" xmlns:xs="http://www.w3.org/2001/XMLSchema" xmlns:p="http://schemas.microsoft.com/office/2006/metadata/properties" targetNamespace="http://schemas.microsoft.com/office/2006/metadata/properties" ma:root="true" ma:fieldsID="5e97a6f37767e4c84f18c2cfb95bf7a3">
     <xsd:element name="properties">
@@ -11430,12 +11355,6 @@
 </ct:contentTypeSchema>
 </file>
 
-<file path=customXml/item3.xml><?xml version="1.0" encoding="utf-8"?>
-<p:properties xmlns:p="http://schemas.microsoft.com/office/2006/metadata/properties" xmlns:xsi="http://www.w3.org/2001/XMLSchema-instance" xmlns:pc="http://schemas.microsoft.com/office/infopath/2007/PartnerControls">
-  <documentManagement/>
-</p:properties>
-</file>
-
 <file path=customXml/itemProps1.xml><?xml version="1.0" encoding="utf-8"?>
 <ds:datastoreItem xmlns:ds="http://schemas.openxmlformats.org/officeDocument/2006/customXml" ds:itemID="{D03F60F6-267C-4F0B-90AC-53495EF22DB8}">
   <ds:schemaRefs>
@@ -11445,22 +11364,6 @@
 </file>
 
 <file path=customXml/itemProps2.xml><?xml version="1.0" encoding="utf-8"?>
-<ds:datastoreItem xmlns:ds="http://schemas.openxmlformats.org/officeDocument/2006/customXml" ds:itemID="{B49647F1-7481-497C-BFCD-436328A8BAC2}">
-  <ds:schemaRefs>
-    <ds:schemaRef ds:uri="http://schemas.microsoft.com/office/2006/metadata/contentType"/>
-    <ds:schemaRef ds:uri="http://schemas.microsoft.com/office/2006/metadata/properties/metaAttributes"/>
-    <ds:schemaRef ds:uri="http://www.w3.org/2001/XMLSchema"/>
-    <ds:schemaRef ds:uri="http://schemas.microsoft.com/office/2006/metadata/properties"/>
-    <ds:schemaRef ds:uri="http://schemas.openxmlformats.org/package/2006/metadata/core-properties"/>
-    <ds:schemaRef ds:uri="http://purl.org/dc/elements/1.1/"/>
-    <ds:schemaRef ds:uri="http://purl.org/dc/terms/"/>
-    <ds:schemaRef ds:uri="http://schemas.microsoft.com/internal/obd"/>
-    <ds:schemaRef ds:uri="http://schemas.microsoft.com/office/infopath/2007/PartnerControls"/>
-  </ds:schemaRefs>
-</ds:datastoreItem>
-</file>
-
-<file path=customXml/itemProps3.xml><?xml version="1.0" encoding="utf-8"?>
 <ds:datastoreItem xmlns:ds="http://schemas.openxmlformats.org/officeDocument/2006/customXml" ds:itemID="{19C64E80-8200-4669-BC3C-EA57A9064010}">
   <ds:schemaRefs>
     <ds:schemaRef ds:uri="http://schemas.microsoft.com/office/infopath/2007/PartnerControls"/>
@@ -11475,4 +11378,20 @@
     <ds:schemaRef ds:uri="http://purl.org/dc/terms/"/>
   </ds:schemaRefs>
 </ds:datastoreItem>
+</file>
+
+<file path=customXml/itemProps3.xml><?xml version="1.0" encoding="utf-8"?>
+<ds:datastoreItem xmlns:ds="http://schemas.openxmlformats.org/officeDocument/2006/customXml" ds:itemID="{B49647F1-7481-497C-BFCD-436328A8BAC2}">
+  <ds:schemaRefs>
+    <ds:schemaRef ds:uri="http://schemas.microsoft.com/office/2006/metadata/contentType"/>
+    <ds:schemaRef ds:uri="http://schemas.microsoft.com/office/2006/metadata/properties/metaAttributes"/>
+    <ds:schemaRef ds:uri="http://www.w3.org/2001/XMLSchema"/>
+    <ds:schemaRef ds:uri="http://schemas.microsoft.com/office/2006/metadata/properties"/>
+    <ds:schemaRef ds:uri="http://schemas.openxmlformats.org/package/2006/metadata/core-properties"/>
+    <ds:schemaRef ds:uri="http://purl.org/dc/elements/1.1/"/>
+    <ds:schemaRef ds:uri="http://purl.org/dc/terms/"/>
+    <ds:schemaRef ds:uri="http://schemas.microsoft.com/internal/obd"/>
+    <ds:schemaRef ds:uri="http://schemas.microsoft.com/office/infopath/2007/PartnerControls"/>
+  </ds:schemaRefs>
+</ds:datastoreItem>
 </file>
</xml_diff>